<commit_message>
Updated ppt and html
</commit_message>
<xml_diff>
--- a/slides/Project3_slides.pptx
+++ b/slides/Project3_slides.pptx
@@ -108,6 +108,11 @@
       </a:defRPr>
     </a:lvl9pPr>
   </p:defaultTextStyle>
+  <p:extLst>
+    <p:ext uri="{EFAFB233-063F-42B5-8137-9DF3F51BA10A}">
+      <p15:sldGuideLst xmlns:p15="http://schemas.microsoft.com/office/powerpoint/2012/main"/>
+    </p:ext>
+  </p:extLst>
 </p:presentation>
 </file>
 
@@ -3538,7 +3543,7 @@
         <p:spPr>
           <a:xfrm>
             <a:off x="6452309" y="1753386"/>
-            <a:ext cx="4805691" cy="1623611"/>
+            <a:ext cx="4805996" cy="1623611"/>
           </a:xfrm>
         </p:spPr>
         <p:txBody>
@@ -4030,10 +4035,10 @@
       </p:grpSpPr>
       <p:sp>
         <p:nvSpPr>
-          <p:cNvPr id="2" name="Rectangle 1">
-            <a:extLst>
-              <a:ext uri="{FF2B5EF4-FFF2-40B4-BE49-F238E27FC236}">
-                <a16:creationId xmlns:a16="http://schemas.microsoft.com/office/drawing/2014/main" id="{92273403-3C19-4354-B8F0-9B711F24B0F6}"/>
+          <p:cNvPr id="27" name="Rectangle 26">
+            <a:extLst>
+              <a:ext uri="{FF2B5EF4-FFF2-40B4-BE49-F238E27FC236}">
+                <a16:creationId xmlns:a16="http://schemas.microsoft.com/office/drawing/2014/main" id="{EAB7A3F3-3773-4F86-B91C-343535820671}"/>
               </a:ext>
             </a:extLst>
           </p:cNvPr>
@@ -4042,21 +4047,794 @@
         </p:nvSpPr>
         <p:spPr>
           <a:xfrm>
-            <a:off x="806095" y="1254920"/>
-            <a:ext cx="980387" cy="871702"/>
+            <a:off x="0" y="-2966"/>
+            <a:ext cx="12192000" cy="840856"/>
           </a:xfrm>
           <a:prstGeom prst="rect">
             <a:avLst/>
           </a:prstGeom>
           <a:solidFill>
+            <a:schemeClr val="accent5">
+              <a:lumMod val="50000"/>
+            </a:schemeClr>
+          </a:solidFill>
+          <a:ln>
+            <a:noFill/>
+          </a:ln>
+        </p:spPr>
+        <p:style>
+          <a:lnRef idx="2">
             <a:schemeClr val="accent1">
-              <a:lumMod val="20000"/>
-              <a:lumOff val="80000"/>
+              <a:shade val="50000"/>
+            </a:schemeClr>
+          </a:lnRef>
+          <a:fillRef idx="1">
+            <a:schemeClr val="accent1"/>
+          </a:fillRef>
+          <a:effectRef idx="0">
+            <a:schemeClr val="accent1"/>
+          </a:effectRef>
+          <a:fontRef idx="minor">
+            <a:schemeClr val="lt1"/>
+          </a:fontRef>
+        </p:style>
+        <p:txBody>
+          <a:bodyPr rtlCol="0" anchor="ctr"/>
+          <a:lstStyle/>
+          <a:p>
+            <a:pPr algn="ctr"/>
+            <a:endParaRPr lang="en-US"/>
+          </a:p>
+        </p:txBody>
+      </p:sp>
+      <p:sp>
+        <p:nvSpPr>
+          <p:cNvPr id="2" name="Rectangle: Rounded Corners 1">
+            <a:extLst>
+              <a:ext uri="{FF2B5EF4-FFF2-40B4-BE49-F238E27FC236}">
+                <a16:creationId xmlns:a16="http://schemas.microsoft.com/office/drawing/2014/main" id="{92273403-3C19-4354-B8F0-9B711F24B0F6}"/>
+              </a:ext>
+            </a:extLst>
+          </p:cNvPr>
+          <p:cNvSpPr/>
+          <p:nvPr/>
+        </p:nvSpPr>
+        <p:spPr>
+          <a:xfrm>
+            <a:off x="357094" y="2150351"/>
+            <a:ext cx="1645920" cy="871702"/>
+          </a:xfrm>
+          <a:prstGeom prst="roundRect">
+            <a:avLst/>
+          </a:prstGeom>
+          <a:solidFill>
+            <a:schemeClr val="accent1">
+              <a:lumMod val="75000"/>
+            </a:schemeClr>
+          </a:solidFill>
+          <a:ln w="12700" cap="flat" cmpd="sng" algn="ctr">
+            <a:solidFill>
+              <a:prstClr val="white">
+                <a:hueOff val="0"/>
+                <a:satOff val="0"/>
+                <a:lumOff val="0"/>
+                <a:alphaOff val="0"/>
+              </a:prstClr>
+            </a:solidFill>
+            <a:prstDash val="solid"/>
+            <a:miter lim="800000"/>
+          </a:ln>
+          <a:effectLst/>
+        </p:spPr>
+        <p:txBody>
+          <a:bodyPr spcFirstLastPara="0" vert="horz" wrap="square" lIns="120015" tIns="40005" rIns="40005" bIns="40005" numCol="1" spcCol="1270" anchor="ctr" anchorCtr="0">
+            <a:noAutofit/>
+          </a:bodyPr>
+          <a:lstStyle/>
+          <a:p>
+            <a:pPr algn="ctr"/>
+            <a:r>
+              <a:rPr lang="en-US" dirty="0">
+                <a:solidFill>
+                  <a:schemeClr val="bg1"/>
+                </a:solidFill>
+              </a:rPr>
+              <a:t>Boston Marathon Finishers Data</a:t>
+            </a:r>
+          </a:p>
+        </p:txBody>
+      </p:sp>
+      <p:sp>
+        <p:nvSpPr>
+          <p:cNvPr id="3" name="Rectangle: Rounded Corners 2">
+            <a:extLst>
+              <a:ext uri="{FF2B5EF4-FFF2-40B4-BE49-F238E27FC236}">
+                <a16:creationId xmlns:a16="http://schemas.microsoft.com/office/drawing/2014/main" id="{9C04E4C0-4473-4D43-883B-1E2B0FBA28AA}"/>
+              </a:ext>
+            </a:extLst>
+          </p:cNvPr>
+          <p:cNvSpPr/>
+          <p:nvPr/>
+        </p:nvSpPr>
+        <p:spPr>
+          <a:xfrm>
+            <a:off x="2277214" y="2129002"/>
+            <a:ext cx="1645920" cy="914400"/>
+          </a:xfrm>
+          <a:prstGeom prst="roundRect">
+            <a:avLst/>
+          </a:prstGeom>
+          <a:solidFill>
+            <a:schemeClr val="accent1">
+              <a:lumMod val="60000"/>
+              <a:lumOff val="40000"/>
+            </a:schemeClr>
+          </a:solidFill>
+          <a:ln w="12700" cap="flat" cmpd="sng" algn="ctr">
+            <a:solidFill>
+              <a:prstClr val="white">
+                <a:hueOff val="0"/>
+                <a:satOff val="0"/>
+                <a:lumOff val="0"/>
+                <a:alphaOff val="0"/>
+              </a:prstClr>
+            </a:solidFill>
+            <a:prstDash val="solid"/>
+            <a:miter lim="800000"/>
+          </a:ln>
+          <a:effectLst/>
+        </p:spPr>
+        <p:txBody>
+          <a:bodyPr spcFirstLastPara="0" vert="horz" wrap="square" lIns="120015" tIns="40005" rIns="40005" bIns="40005" numCol="1" spcCol="1270" anchor="ctr" anchorCtr="0">
+            <a:noAutofit/>
+          </a:bodyPr>
+          <a:lstStyle/>
+          <a:p>
+            <a:pPr algn="ctr"/>
+            <a:r>
+              <a:rPr lang="en-US" dirty="0"/>
+              <a:t>Data Cleanup &amp; Preparation</a:t>
+            </a:r>
+          </a:p>
+        </p:txBody>
+      </p:sp>
+      <p:sp>
+        <p:nvSpPr>
+          <p:cNvPr id="10" name="TextBox 9">
+            <a:extLst>
+              <a:ext uri="{FF2B5EF4-FFF2-40B4-BE49-F238E27FC236}">
+                <a16:creationId xmlns:a16="http://schemas.microsoft.com/office/drawing/2014/main" id="{036C6107-42DD-4BE9-9664-F1D1FE29CD66}"/>
+              </a:ext>
+            </a:extLst>
+          </p:cNvPr>
+          <p:cNvSpPr txBox="1"/>
+          <p:nvPr/>
+        </p:nvSpPr>
+        <p:spPr>
+          <a:xfrm>
+            <a:off x="2309090" y="3049742"/>
+            <a:ext cx="1851298" cy="1477328"/>
+          </a:xfrm>
+          <a:prstGeom prst="rect">
+            <a:avLst/>
+          </a:prstGeom>
+          <a:noFill/>
+        </p:spPr>
+        <p:txBody>
+          <a:bodyPr wrap="square" rtlCol="0">
+            <a:spAutoFit/>
+          </a:bodyPr>
+          <a:lstStyle>
+            <a:defPPr>
+              <a:defRPr lang="en-US"/>
+            </a:defPPr>
+            <a:lvl1pPr marL="227013" indent="-227013">
+              <a:spcAft>
+                <a:spcPts val="600"/>
+              </a:spcAft>
+              <a:buFont typeface="Arial" panose="020B0604020202020204" pitchFamily="34" charset="0"/>
+              <a:buChar char="•"/>
+              <a:defRPr sz="1600"/>
+            </a:lvl1pPr>
+          </a:lstStyle>
+          <a:p>
+            <a:pPr marL="176213" indent="-176213">
+              <a:tabLst>
+                <a:tab pos="176213" algn="l"/>
+              </a:tabLst>
+            </a:pPr>
+            <a:r>
+              <a:rPr lang="en-US" dirty="0"/>
+              <a:t>Convert gender to binary values</a:t>
+            </a:r>
+          </a:p>
+          <a:p>
+            <a:pPr marL="176213" indent="-176213">
+              <a:tabLst>
+                <a:tab pos="176213" algn="l"/>
+              </a:tabLst>
+            </a:pPr>
+            <a:r>
+              <a:rPr lang="en-US" dirty="0"/>
+              <a:t>Remove null rows</a:t>
+            </a:r>
+          </a:p>
+          <a:p>
+            <a:pPr marL="176213" indent="-176213">
+              <a:tabLst>
+                <a:tab pos="176213" algn="l"/>
+              </a:tabLst>
+            </a:pPr>
+            <a:r>
+              <a:rPr lang="en-US" dirty="0"/>
+              <a:t>Convert split times to seconds</a:t>
+            </a:r>
+          </a:p>
+        </p:txBody>
+      </p:sp>
+      <p:sp>
+        <p:nvSpPr>
+          <p:cNvPr id="23" name="Rectangle: Rounded Corners 22">
+            <a:extLst>
+              <a:ext uri="{FF2B5EF4-FFF2-40B4-BE49-F238E27FC236}">
+                <a16:creationId xmlns:a16="http://schemas.microsoft.com/office/drawing/2014/main" id="{3EF9691A-22F8-4AF7-ACDD-7B6C09A501AC}"/>
+              </a:ext>
+            </a:extLst>
+          </p:cNvPr>
+          <p:cNvSpPr/>
+          <p:nvPr/>
+        </p:nvSpPr>
+        <p:spPr>
+          <a:xfrm>
+            <a:off x="4197334" y="2129002"/>
+            <a:ext cx="1645920" cy="914400"/>
+          </a:xfrm>
+          <a:prstGeom prst="roundRect">
+            <a:avLst/>
+          </a:prstGeom>
+          <a:solidFill>
+            <a:schemeClr val="accent1">
+              <a:lumMod val="40000"/>
+              <a:lumOff val="60000"/>
+            </a:schemeClr>
+          </a:solidFill>
+          <a:ln w="12700" cap="flat" cmpd="sng" algn="ctr">
+            <a:solidFill>
+              <a:prstClr val="white">
+                <a:hueOff val="0"/>
+                <a:satOff val="0"/>
+                <a:lumOff val="0"/>
+                <a:alphaOff val="0"/>
+              </a:prstClr>
+            </a:solidFill>
+            <a:prstDash val="solid"/>
+            <a:miter lim="800000"/>
+          </a:ln>
+          <a:effectLst/>
+        </p:spPr>
+        <p:txBody>
+          <a:bodyPr spcFirstLastPara="0" vert="horz" wrap="square" lIns="120015" tIns="40005" rIns="40005" bIns="40005" numCol="1" spcCol="1270" anchor="ctr" anchorCtr="0">
+            <a:noAutofit/>
+          </a:bodyPr>
+          <a:lstStyle/>
+          <a:p>
+            <a:pPr algn="ctr"/>
+            <a:r>
+              <a:rPr lang="en-US" dirty="0">
+                <a:solidFill>
+                  <a:schemeClr val="tx1"/>
+                </a:solidFill>
+              </a:rPr>
+              <a:t>Assign Data to Target &amp; Split</a:t>
+            </a:r>
+          </a:p>
+        </p:txBody>
+      </p:sp>
+      <p:sp>
+        <p:nvSpPr>
+          <p:cNvPr id="26" name="Rectangle: Rounded Corners 25">
+            <a:extLst>
+              <a:ext uri="{FF2B5EF4-FFF2-40B4-BE49-F238E27FC236}">
+                <a16:creationId xmlns:a16="http://schemas.microsoft.com/office/drawing/2014/main" id="{8541CA74-E1EB-4FB4-A581-BAA0C0EBD4D2}"/>
+              </a:ext>
+            </a:extLst>
+          </p:cNvPr>
+          <p:cNvSpPr/>
+          <p:nvPr/>
+        </p:nvSpPr>
+        <p:spPr>
+          <a:xfrm>
+            <a:off x="6117454" y="2129002"/>
+            <a:ext cx="1645920" cy="914400"/>
+          </a:xfrm>
+          <a:prstGeom prst="roundRect">
+            <a:avLst/>
+          </a:prstGeom>
+          <a:solidFill>
+            <a:schemeClr val="accent1">
+              <a:lumMod val="40000"/>
+              <a:lumOff val="60000"/>
+            </a:schemeClr>
+          </a:solidFill>
+          <a:ln w="12700" cap="flat" cmpd="sng" algn="ctr">
+            <a:solidFill>
+              <a:prstClr val="white">
+                <a:hueOff val="0"/>
+                <a:satOff val="0"/>
+                <a:lumOff val="0"/>
+                <a:alphaOff val="0"/>
+              </a:prstClr>
+            </a:solidFill>
+            <a:prstDash val="solid"/>
+            <a:miter lim="800000"/>
+          </a:ln>
+          <a:effectLst/>
+        </p:spPr>
+        <p:txBody>
+          <a:bodyPr spcFirstLastPara="0" vert="horz" wrap="square" lIns="120015" tIns="40005" rIns="40005" bIns="40005" numCol="1" spcCol="1270" anchor="ctr" anchorCtr="0">
+            <a:noAutofit/>
+          </a:bodyPr>
+          <a:lstStyle/>
+          <a:p>
+            <a:pPr algn="ctr"/>
+            <a:r>
+              <a:rPr lang="en-US" dirty="0">
+                <a:solidFill>
+                  <a:schemeClr val="tx1"/>
+                </a:solidFill>
+              </a:rPr>
+              <a:t>Create Model</a:t>
+            </a:r>
+          </a:p>
+        </p:txBody>
+      </p:sp>
+      <p:sp>
+        <p:nvSpPr>
+          <p:cNvPr id="41" name="TextBox 40">
+            <a:extLst>
+              <a:ext uri="{FF2B5EF4-FFF2-40B4-BE49-F238E27FC236}">
+                <a16:creationId xmlns:a16="http://schemas.microsoft.com/office/drawing/2014/main" id="{35B485F5-B913-44A5-91FF-49FA10C69DF1}"/>
+              </a:ext>
+            </a:extLst>
+          </p:cNvPr>
+          <p:cNvSpPr txBox="1"/>
+          <p:nvPr/>
+        </p:nvSpPr>
+        <p:spPr>
+          <a:xfrm>
+            <a:off x="6117453" y="3013631"/>
+            <a:ext cx="1836406" cy="1646605"/>
+          </a:xfrm>
+          <a:prstGeom prst="rect">
+            <a:avLst/>
+          </a:prstGeom>
+          <a:noFill/>
+        </p:spPr>
+        <p:txBody>
+          <a:bodyPr wrap="square" rtlCol="0">
+            <a:spAutoFit/>
+          </a:bodyPr>
+          <a:lstStyle/>
+          <a:p>
+            <a:pPr marL="176213" indent="-176213">
+              <a:spcAft>
+                <a:spcPts val="600"/>
+              </a:spcAft>
+              <a:buFont typeface="Arial" panose="020B0604020202020204" pitchFamily="34" charset="0"/>
+              <a:buChar char="•"/>
+            </a:pPr>
+            <a:r>
+              <a:rPr lang="en-US" sz="1600" dirty="0"/>
+              <a:t>Built a linear regression model</a:t>
+            </a:r>
+          </a:p>
+          <a:p>
+            <a:pPr marL="176213" indent="-176213">
+              <a:spcAft>
+                <a:spcPts val="600"/>
+              </a:spcAft>
+              <a:buFont typeface="Arial" panose="020B0604020202020204" pitchFamily="34" charset="0"/>
+              <a:buChar char="•"/>
+            </a:pPr>
+            <a:r>
+              <a:rPr lang="en-US" sz="1600" dirty="0"/>
+              <a:t>Train the model using specific attributes of our dataset</a:t>
+            </a:r>
+          </a:p>
+        </p:txBody>
+      </p:sp>
+      <p:sp>
+        <p:nvSpPr>
+          <p:cNvPr id="42" name="Rectangle: Rounded Corners 41">
+            <a:extLst>
+              <a:ext uri="{FF2B5EF4-FFF2-40B4-BE49-F238E27FC236}">
+                <a16:creationId xmlns:a16="http://schemas.microsoft.com/office/drawing/2014/main" id="{AD46BB5E-E462-465E-A934-111F561C7501}"/>
+              </a:ext>
+            </a:extLst>
+          </p:cNvPr>
+          <p:cNvSpPr/>
+          <p:nvPr/>
+        </p:nvSpPr>
+        <p:spPr>
+          <a:xfrm>
+            <a:off x="8037574" y="2129002"/>
+            <a:ext cx="1645920" cy="914400"/>
+          </a:xfrm>
+          <a:prstGeom prst="roundRect">
+            <a:avLst/>
+          </a:prstGeom>
+          <a:solidFill>
+            <a:schemeClr val="accent1">
+              <a:lumMod val="40000"/>
+              <a:lumOff val="60000"/>
+            </a:schemeClr>
+          </a:solidFill>
+          <a:ln w="12700" cap="flat" cmpd="sng" algn="ctr">
+            <a:solidFill>
+              <a:prstClr val="white">
+                <a:hueOff val="0"/>
+                <a:satOff val="0"/>
+                <a:lumOff val="0"/>
+                <a:alphaOff val="0"/>
+              </a:prstClr>
+            </a:solidFill>
+            <a:prstDash val="solid"/>
+            <a:miter lim="800000"/>
+          </a:ln>
+          <a:effectLst/>
+        </p:spPr>
+        <p:txBody>
+          <a:bodyPr spcFirstLastPara="0" vert="horz" wrap="square" lIns="120015" tIns="40005" rIns="40005" bIns="40005" numCol="1" spcCol="1270" anchor="ctr" anchorCtr="0">
+            <a:noAutofit/>
+          </a:bodyPr>
+          <a:lstStyle/>
+          <a:p>
+            <a:pPr algn="ctr"/>
+            <a:r>
+              <a:rPr lang="en-US" dirty="0">
+                <a:solidFill>
+                  <a:schemeClr val="tx1"/>
+                </a:solidFill>
+              </a:rPr>
+              <a:t>Test &amp; Analyze Model Accuracy</a:t>
+            </a:r>
+          </a:p>
+        </p:txBody>
+      </p:sp>
+      <p:sp>
+        <p:nvSpPr>
+          <p:cNvPr id="45" name="TextBox 44">
+            <a:extLst>
+              <a:ext uri="{FF2B5EF4-FFF2-40B4-BE49-F238E27FC236}">
+                <a16:creationId xmlns:a16="http://schemas.microsoft.com/office/drawing/2014/main" id="{DF3D7BC0-AF37-478A-8830-A809DA035801}"/>
+              </a:ext>
+            </a:extLst>
+          </p:cNvPr>
+          <p:cNvSpPr txBox="1"/>
+          <p:nvPr/>
+        </p:nvSpPr>
+        <p:spPr>
+          <a:xfrm>
+            <a:off x="8074520" y="3038918"/>
+            <a:ext cx="1883174" cy="1969770"/>
+          </a:xfrm>
+          <a:prstGeom prst="rect">
+            <a:avLst/>
+          </a:prstGeom>
+          <a:noFill/>
+        </p:spPr>
+        <p:txBody>
+          <a:bodyPr wrap="square" rtlCol="0">
+            <a:spAutoFit/>
+          </a:bodyPr>
+          <a:lstStyle/>
+          <a:p>
+            <a:pPr marL="176213" indent="-176213">
+              <a:spcBef>
+                <a:spcPts val="600"/>
+              </a:spcBef>
+              <a:buFont typeface="Arial" panose="020B0604020202020204" pitchFamily="34" charset="0"/>
+              <a:buChar char="•"/>
+            </a:pPr>
+            <a:r>
+              <a:rPr lang="en-US" sz="1600" dirty="0"/>
+              <a:t>Run the model with test data</a:t>
+            </a:r>
+          </a:p>
+          <a:p>
+            <a:pPr marL="176213" indent="-176213">
+              <a:spcBef>
+                <a:spcPts val="600"/>
+              </a:spcBef>
+              <a:buFont typeface="Arial" panose="020B0604020202020204" pitchFamily="34" charset="0"/>
+              <a:buChar char="•"/>
+            </a:pPr>
+            <a:r>
+              <a:rPr lang="en-US" sz="1600" dirty="0"/>
+              <a:t>Calculate MSE and R2 to determine model accuracy</a:t>
+            </a:r>
+          </a:p>
+          <a:p>
+            <a:pPr marL="176213" indent="-176213">
+              <a:spcBef>
+                <a:spcPts val="600"/>
+              </a:spcBef>
+              <a:buFont typeface="Arial" panose="020B0604020202020204" pitchFamily="34" charset="0"/>
+              <a:buChar char="•"/>
+            </a:pPr>
+            <a:r>
+              <a:rPr lang="en-US" sz="1600" dirty="0"/>
+              <a:t>Finished model saved as static file</a:t>
+            </a:r>
+          </a:p>
+        </p:txBody>
+      </p:sp>
+      <p:sp>
+        <p:nvSpPr>
+          <p:cNvPr id="55" name="Rectangle: Rounded Corners 54">
+            <a:extLst>
+              <a:ext uri="{FF2B5EF4-FFF2-40B4-BE49-F238E27FC236}">
+                <a16:creationId xmlns:a16="http://schemas.microsoft.com/office/drawing/2014/main" id="{43CA38BC-3C1C-4591-B6EA-6AEE96ADE3E7}"/>
+              </a:ext>
+            </a:extLst>
+          </p:cNvPr>
+          <p:cNvSpPr/>
+          <p:nvPr/>
+        </p:nvSpPr>
+        <p:spPr>
+          <a:xfrm>
+            <a:off x="9957695" y="2129002"/>
+            <a:ext cx="1645920" cy="914400"/>
+          </a:xfrm>
+          <a:prstGeom prst="roundRect">
+            <a:avLst/>
+          </a:prstGeom>
+          <a:solidFill>
+            <a:schemeClr val="accent1">
+              <a:lumMod val="40000"/>
+              <a:lumOff val="60000"/>
+            </a:schemeClr>
+          </a:solidFill>
+          <a:ln w="12700" cap="flat" cmpd="sng" algn="ctr">
+            <a:solidFill>
+              <a:prstClr val="white">
+                <a:hueOff val="0"/>
+                <a:satOff val="0"/>
+                <a:lumOff val="0"/>
+                <a:alphaOff val="0"/>
+              </a:prstClr>
+            </a:solidFill>
+            <a:prstDash val="solid"/>
+            <a:miter lim="800000"/>
+          </a:ln>
+          <a:effectLst/>
+        </p:spPr>
+        <p:txBody>
+          <a:bodyPr spcFirstLastPara="0" vert="horz" wrap="square" lIns="120015" tIns="40005" rIns="40005" bIns="40005" numCol="1" spcCol="1270" anchor="ctr" anchorCtr="0">
+            <a:noAutofit/>
+          </a:bodyPr>
+          <a:lstStyle/>
+          <a:p>
+            <a:pPr algn="ctr"/>
+            <a:r>
+              <a:rPr lang="en-US" dirty="0">
+                <a:solidFill>
+                  <a:schemeClr val="tx1"/>
+                </a:solidFill>
+              </a:rPr>
+              <a:t>Use Model for Predictions</a:t>
+            </a:r>
+          </a:p>
+        </p:txBody>
+      </p:sp>
+      <p:sp>
+        <p:nvSpPr>
+          <p:cNvPr id="70" name="TextBox 69">
+            <a:extLst>
+              <a:ext uri="{FF2B5EF4-FFF2-40B4-BE49-F238E27FC236}">
+                <a16:creationId xmlns:a16="http://schemas.microsoft.com/office/drawing/2014/main" id="{C15AD00E-92A6-4703-8B14-64B9B7E021C4}"/>
+              </a:ext>
+            </a:extLst>
+          </p:cNvPr>
+          <p:cNvSpPr txBox="1"/>
+          <p:nvPr/>
+        </p:nvSpPr>
+        <p:spPr>
+          <a:xfrm>
+            <a:off x="9994639" y="3038918"/>
+            <a:ext cx="1883178" cy="2215991"/>
+          </a:xfrm>
+          <a:prstGeom prst="rect">
+            <a:avLst/>
+          </a:prstGeom>
+          <a:noFill/>
+        </p:spPr>
+        <p:txBody>
+          <a:bodyPr wrap="square" rtlCol="0">
+            <a:spAutoFit/>
+          </a:bodyPr>
+          <a:lstStyle/>
+          <a:p>
+            <a:pPr marL="176213" indent="-176213">
+              <a:spcBef>
+                <a:spcPts val="600"/>
+              </a:spcBef>
+              <a:buFont typeface="Arial" panose="020B0604020202020204" pitchFamily="34" charset="0"/>
+              <a:buChar char="•"/>
+            </a:pPr>
+            <a:r>
+              <a:rPr lang="en-US" sz="1600" dirty="0"/>
+              <a:t>Use HTML to gather user’s input</a:t>
+            </a:r>
+          </a:p>
+          <a:p>
+            <a:pPr marL="176213" indent="-176213">
+              <a:spcBef>
+                <a:spcPts val="600"/>
+              </a:spcBef>
+              <a:buFont typeface="Arial" panose="020B0604020202020204" pitchFamily="34" charset="0"/>
+              <a:buChar char="•"/>
+            </a:pPr>
+            <a:r>
+              <a:rPr lang="en-US" sz="1600" dirty="0"/>
+              <a:t>Load model with Flask and run with user’s inputs</a:t>
+            </a:r>
+          </a:p>
+          <a:p>
+            <a:pPr marL="176213" indent="-176213">
+              <a:spcBef>
+                <a:spcPts val="600"/>
+              </a:spcBef>
+              <a:buFont typeface="Arial" panose="020B0604020202020204" pitchFamily="34" charset="0"/>
+              <a:buChar char="•"/>
+            </a:pPr>
+            <a:r>
+              <a:rPr lang="en-US" sz="1600" dirty="0"/>
+              <a:t>Return results to the HTML</a:t>
+            </a:r>
+          </a:p>
+        </p:txBody>
+      </p:sp>
+      <p:sp>
+        <p:nvSpPr>
+          <p:cNvPr id="25" name="TextBox 24">
+            <a:extLst>
+              <a:ext uri="{FF2B5EF4-FFF2-40B4-BE49-F238E27FC236}">
+                <a16:creationId xmlns:a16="http://schemas.microsoft.com/office/drawing/2014/main" id="{10214D64-EC42-445D-AF46-6EDBA50C2CFA}"/>
+              </a:ext>
+            </a:extLst>
+          </p:cNvPr>
+          <p:cNvSpPr txBox="1"/>
+          <p:nvPr/>
+        </p:nvSpPr>
+        <p:spPr>
+          <a:xfrm>
+            <a:off x="806095" y="26787"/>
+            <a:ext cx="11385905" cy="707886"/>
+          </a:xfrm>
+          <a:prstGeom prst="rect">
+            <a:avLst/>
+          </a:prstGeom>
+          <a:noFill/>
+        </p:spPr>
+        <p:txBody>
+          <a:bodyPr wrap="square" rtlCol="0">
+            <a:spAutoFit/>
+          </a:bodyPr>
+          <a:lstStyle/>
+          <a:p>
+            <a:r>
+              <a:rPr lang="en-US" sz="4000" dirty="0">
+                <a:solidFill>
+                  <a:schemeClr val="bg1"/>
+                </a:solidFill>
+              </a:rPr>
+              <a:t>Machine Learning Process</a:t>
+            </a:r>
+          </a:p>
+        </p:txBody>
+      </p:sp>
+      <p:sp>
+        <p:nvSpPr>
+          <p:cNvPr id="58" name="TextBox 57">
+            <a:extLst>
+              <a:ext uri="{FF2B5EF4-FFF2-40B4-BE49-F238E27FC236}">
+                <a16:creationId xmlns:a16="http://schemas.microsoft.com/office/drawing/2014/main" id="{595802BD-8F30-4C71-BAC9-3D168B8C146D}"/>
+              </a:ext>
+            </a:extLst>
+          </p:cNvPr>
+          <p:cNvSpPr txBox="1"/>
+          <p:nvPr/>
+        </p:nvSpPr>
+        <p:spPr>
+          <a:xfrm>
+            <a:off x="4197333" y="3013631"/>
+            <a:ext cx="1799460" cy="1969770"/>
+          </a:xfrm>
+          <a:prstGeom prst="rect">
+            <a:avLst/>
+          </a:prstGeom>
+          <a:noFill/>
+        </p:spPr>
+        <p:txBody>
+          <a:bodyPr wrap="square" rtlCol="0">
+            <a:spAutoFit/>
+          </a:bodyPr>
+          <a:lstStyle/>
+          <a:p>
+            <a:pPr marL="176213" indent="-176213">
+              <a:spcAft>
+                <a:spcPts val="600"/>
+              </a:spcAft>
+              <a:buFont typeface="Arial" panose="020B0604020202020204" pitchFamily="34" charset="0"/>
+              <a:buChar char="•"/>
+            </a:pPr>
+            <a:r>
+              <a:rPr lang="en-US" sz="1600" dirty="0"/>
+              <a:t>Determine data attributes to train model</a:t>
+            </a:r>
+          </a:p>
+          <a:p>
+            <a:pPr marL="176213" indent="-176213">
+              <a:spcAft>
+                <a:spcPts val="600"/>
+              </a:spcAft>
+              <a:buFont typeface="Arial" panose="020B0604020202020204" pitchFamily="34" charset="0"/>
+              <a:buChar char="•"/>
+            </a:pPr>
+            <a:r>
+              <a:rPr lang="en-US" sz="1600" dirty="0"/>
+              <a:t>Assign the data set to a target</a:t>
+            </a:r>
+          </a:p>
+          <a:p>
+            <a:pPr marL="176213" indent="-176213">
+              <a:spcAft>
+                <a:spcPts val="600"/>
+              </a:spcAft>
+              <a:buFont typeface="Arial" panose="020B0604020202020204" pitchFamily="34" charset="0"/>
+              <a:buChar char="•"/>
+            </a:pPr>
+            <a:r>
+              <a:rPr lang="en-US" sz="1600" dirty="0"/>
+              <a:t>Split into Train and Test datasets</a:t>
+            </a:r>
+          </a:p>
+        </p:txBody>
+      </p:sp>
+      <p:sp>
+        <p:nvSpPr>
+          <p:cNvPr id="53" name="Arrow: Right 52">
+            <a:extLst>
+              <a:ext uri="{FF2B5EF4-FFF2-40B4-BE49-F238E27FC236}">
+                <a16:creationId xmlns:a16="http://schemas.microsoft.com/office/drawing/2014/main" id="{1FE0126F-397A-486D-A975-1DE8DD53484B}"/>
+              </a:ext>
+            </a:extLst>
+          </p:cNvPr>
+          <p:cNvSpPr/>
+          <p:nvPr/>
+        </p:nvSpPr>
+        <p:spPr>
+          <a:xfrm>
+            <a:off x="1902690" y="2318348"/>
+            <a:ext cx="544947" cy="535709"/>
+          </a:xfrm>
+          <a:prstGeom prst="rightArrow">
+            <a:avLst>
+              <a:gd name="adj1" fmla="val 50000"/>
+              <a:gd name="adj2" fmla="val 62069"/>
+            </a:avLst>
+          </a:prstGeom>
+          <a:solidFill>
+            <a:schemeClr val="bg1">
+              <a:lumMod val="65000"/>
             </a:schemeClr>
           </a:solidFill>
           <a:ln>
             <a:solidFill>
-              <a:schemeClr val="tx1"/>
+              <a:schemeClr val="bg1">
+                <a:lumMod val="65000"/>
+              </a:schemeClr>
             </a:solidFill>
           </a:ln>
         </p:spPr>
@@ -4081,23 +4859,16 @@
           <a:lstStyle/>
           <a:p>
             <a:pPr algn="ctr"/>
-            <a:r>
-              <a:rPr lang="en-US" sz="1200" dirty="0">
-                <a:solidFill>
-                  <a:schemeClr val="tx1"/>
-                </a:solidFill>
-              </a:rPr>
-              <a:t>Boston Marathon Finishers Data</a:t>
-            </a:r>
-          </a:p>
-        </p:txBody>
-      </p:sp>
-      <p:sp>
-        <p:nvSpPr>
-          <p:cNvPr id="3" name="Rectangle: Rounded Corners 2">
-            <a:extLst>
-              <a:ext uri="{FF2B5EF4-FFF2-40B4-BE49-F238E27FC236}">
-                <a16:creationId xmlns:a16="http://schemas.microsoft.com/office/drawing/2014/main" id="{9C04E4C0-4473-4D43-883B-1E2B0FBA28AA}"/>
+            <a:endParaRPr lang="en-US"/>
+          </a:p>
+        </p:txBody>
+      </p:sp>
+      <p:sp>
+        <p:nvSpPr>
+          <p:cNvPr id="60" name="Arrow: Right 59">
+            <a:extLst>
+              <a:ext uri="{FF2B5EF4-FFF2-40B4-BE49-F238E27FC236}">
+                <a16:creationId xmlns:a16="http://schemas.microsoft.com/office/drawing/2014/main" id="{D68D6652-1A79-4388-9949-04EB5C331EB9}"/>
               </a:ext>
             </a:extLst>
           </p:cNvPr>
@@ -4106,15 +4877,27 @@
         </p:nvSpPr>
         <p:spPr>
           <a:xfrm>
-            <a:off x="3755921" y="1363559"/>
-            <a:ext cx="1089212" cy="654424"/>
+            <a:off x="3829133" y="2318348"/>
+            <a:ext cx="544947" cy="535709"/>
           </a:xfrm>
-          <a:prstGeom prst="roundRect">
-            <a:avLst/>
+          <a:prstGeom prst="rightArrow">
+            <a:avLst>
+              <a:gd name="adj1" fmla="val 50000"/>
+              <a:gd name="adj2" fmla="val 62069"/>
+            </a:avLst>
           </a:prstGeom>
           <a:solidFill>
-            <a:srgbClr val="E1F7CB"/>
+            <a:schemeClr val="bg1">
+              <a:lumMod val="65000"/>
+            </a:schemeClr>
           </a:solidFill>
+          <a:ln>
+            <a:solidFill>
+              <a:schemeClr val="bg1">
+                <a:lumMod val="65000"/>
+              </a:schemeClr>
+            </a:solidFill>
+          </a:ln>
         </p:spPr>
         <p:style>
           <a:lnRef idx="2">
@@ -4137,146 +4920,45 @@
           <a:lstStyle/>
           <a:p>
             <a:pPr algn="ctr"/>
-            <a:r>
-              <a:rPr lang="en-US" sz="1200" dirty="0">
-                <a:solidFill>
-                  <a:schemeClr val="tx1"/>
-                </a:solidFill>
-              </a:rPr>
-              <a:t>Data cleanup and pre-processing</a:t>
-            </a:r>
-          </a:p>
-        </p:txBody>
-      </p:sp>
-      <p:cxnSp>
-        <p:nvCxnSpPr>
-          <p:cNvPr id="6" name="Straight Arrow Connector 5">
-            <a:extLst>
-              <a:ext uri="{FF2B5EF4-FFF2-40B4-BE49-F238E27FC236}">
-                <a16:creationId xmlns:a16="http://schemas.microsoft.com/office/drawing/2014/main" id="{FAB33772-53F1-4485-90C4-47ACBF7AD64E}"/>
-              </a:ext>
-            </a:extLst>
-          </p:cNvPr>
-          <p:cNvCxnSpPr>
-            <a:cxnSpLocks/>
-            <a:stCxn id="2" idx="3"/>
-            <a:endCxn id="3" idx="1"/>
-          </p:cNvCxnSpPr>
+            <a:endParaRPr lang="en-US"/>
+          </a:p>
+        </p:txBody>
+      </p:sp>
+      <p:sp>
+        <p:nvSpPr>
+          <p:cNvPr id="61" name="Arrow: Right 60">
+            <a:extLst>
+              <a:ext uri="{FF2B5EF4-FFF2-40B4-BE49-F238E27FC236}">
+                <a16:creationId xmlns:a16="http://schemas.microsoft.com/office/drawing/2014/main" id="{11116FFA-13C2-404D-9CBE-6B6AE7C807DC}"/>
+              </a:ext>
+            </a:extLst>
+          </p:cNvPr>
+          <p:cNvSpPr/>
           <p:nvPr/>
-        </p:nvCxnSpPr>
+        </p:nvSpPr>
         <p:spPr>
           <a:xfrm>
-            <a:off x="1786482" y="1690771"/>
-            <a:ext cx="1969439" cy="0"/>
+            <a:off x="5755576" y="2318348"/>
+            <a:ext cx="544947" cy="535709"/>
           </a:xfrm>
-          <a:prstGeom prst="straightConnector1">
-            <a:avLst/>
-          </a:prstGeom>
-          <a:ln w="19050">
-            <a:solidFill>
-              <a:schemeClr val="tx1"/>
-            </a:solidFill>
-            <a:headEnd type="none" w="med" len="med"/>
-            <a:tailEnd type="arrow" w="med" len="med"/>
-          </a:ln>
-        </p:spPr>
-        <p:style>
-          <a:lnRef idx="1">
-            <a:schemeClr val="accent1"/>
-          </a:lnRef>
-          <a:fillRef idx="0">
-            <a:schemeClr val="accent1"/>
-          </a:fillRef>
-          <a:effectRef idx="0">
-            <a:schemeClr val="accent1"/>
-          </a:effectRef>
-          <a:fontRef idx="minor">
-            <a:schemeClr val="tx1"/>
-          </a:fontRef>
-        </p:style>
-      </p:cxnSp>
-      <p:sp>
-        <p:nvSpPr>
-          <p:cNvPr id="10" name="TextBox 9">
-            <a:extLst>
-              <a:ext uri="{FF2B5EF4-FFF2-40B4-BE49-F238E27FC236}">
-                <a16:creationId xmlns:a16="http://schemas.microsoft.com/office/drawing/2014/main" id="{036C6107-42DD-4BE9-9664-F1D1FE29CD66}"/>
-              </a:ext>
-            </a:extLst>
-          </p:cNvPr>
-          <p:cNvSpPr txBox="1"/>
-          <p:nvPr/>
-        </p:nvSpPr>
-        <p:spPr>
-          <a:xfrm>
-            <a:off x="2967405" y="2025377"/>
-            <a:ext cx="2666243" cy="738664"/>
-          </a:xfrm>
-          <a:prstGeom prst="rect">
-            <a:avLst/>
-          </a:prstGeom>
-          <a:noFill/>
-        </p:spPr>
-        <p:txBody>
-          <a:bodyPr wrap="square" rtlCol="0">
-            <a:spAutoFit/>
-          </a:bodyPr>
-          <a:lstStyle/>
-          <a:p>
-            <a:pPr marL="285750" indent="-285750">
-              <a:buFont typeface="Arial" panose="020B0604020202020204" pitchFamily="34" charset="0"/>
-              <a:buChar char="•"/>
-            </a:pPr>
-            <a:r>
-              <a:rPr lang="en-US" sz="1400" dirty="0"/>
-              <a:t>Convert gender to 0/1 values</a:t>
-            </a:r>
-          </a:p>
-          <a:p>
-            <a:pPr marL="285750" indent="-285750">
-              <a:buFont typeface="Arial" panose="020B0604020202020204" pitchFamily="34" charset="0"/>
-              <a:buChar char="•"/>
-            </a:pPr>
-            <a:r>
-              <a:rPr lang="en-US" sz="1400" dirty="0"/>
-              <a:t>Remove null rows</a:t>
-            </a:r>
-          </a:p>
-          <a:p>
-            <a:pPr marL="285750" indent="-285750">
-              <a:buFont typeface="Arial" panose="020B0604020202020204" pitchFamily="34" charset="0"/>
-              <a:buChar char="•"/>
-            </a:pPr>
-            <a:r>
-              <a:rPr lang="en-US" sz="1400" dirty="0"/>
-              <a:t>Convert split times to seconds</a:t>
-            </a:r>
-          </a:p>
-        </p:txBody>
-      </p:sp>
-      <p:sp>
-        <p:nvSpPr>
-          <p:cNvPr id="19" name="Rectangle: Rounded Corners 18">
-            <a:extLst>
-              <a:ext uri="{FF2B5EF4-FFF2-40B4-BE49-F238E27FC236}">
-                <a16:creationId xmlns:a16="http://schemas.microsoft.com/office/drawing/2014/main" id="{E27C468F-BAEE-4AFA-90B8-E61834EBD9CB}"/>
-              </a:ext>
-            </a:extLst>
-          </p:cNvPr>
-          <p:cNvSpPr/>
-          <p:nvPr/>
-        </p:nvSpPr>
-        <p:spPr>
-          <a:xfrm>
-            <a:off x="6814571" y="1363559"/>
-            <a:ext cx="1089212" cy="654424"/>
-          </a:xfrm>
-          <a:prstGeom prst="roundRect">
-            <a:avLst/>
+          <a:prstGeom prst="rightArrow">
+            <a:avLst>
+              <a:gd name="adj1" fmla="val 50000"/>
+              <a:gd name="adj2" fmla="val 62069"/>
+            </a:avLst>
           </a:prstGeom>
           <a:solidFill>
-            <a:srgbClr val="FFFFCC"/>
+            <a:schemeClr val="bg1">
+              <a:lumMod val="65000"/>
+            </a:schemeClr>
           </a:solidFill>
+          <a:ln>
+            <a:solidFill>
+              <a:schemeClr val="bg1">
+                <a:lumMod val="65000"/>
+              </a:schemeClr>
+            </a:solidFill>
+          </a:ln>
         </p:spPr>
         <p:style>
           <a:lnRef idx="2">
@@ -4299,87 +4981,45 @@
           <a:lstStyle/>
           <a:p>
             <a:pPr algn="ctr"/>
-            <a:r>
-              <a:rPr lang="en-US" sz="1200" dirty="0">
-                <a:solidFill>
-                  <a:schemeClr val="tx1"/>
-                </a:solidFill>
-              </a:rPr>
-              <a:t>Assign data to target</a:t>
-            </a:r>
-          </a:p>
-        </p:txBody>
-      </p:sp>
-      <p:cxnSp>
-        <p:nvCxnSpPr>
-          <p:cNvPr id="20" name="Straight Arrow Connector 19">
-            <a:extLst>
-              <a:ext uri="{FF2B5EF4-FFF2-40B4-BE49-F238E27FC236}">
-                <a16:creationId xmlns:a16="http://schemas.microsoft.com/office/drawing/2014/main" id="{6FDCB9AE-DFFF-4CF9-9105-D5C1604EE15D}"/>
-              </a:ext>
-            </a:extLst>
-          </p:cNvPr>
-          <p:cNvCxnSpPr>
-            <a:cxnSpLocks/>
-            <a:stCxn id="3" idx="3"/>
-            <a:endCxn id="19" idx="1"/>
-          </p:cNvCxnSpPr>
+            <a:endParaRPr lang="en-US"/>
+          </a:p>
+        </p:txBody>
+      </p:sp>
+      <p:sp>
+        <p:nvSpPr>
+          <p:cNvPr id="62" name="Arrow: Right 61">
+            <a:extLst>
+              <a:ext uri="{FF2B5EF4-FFF2-40B4-BE49-F238E27FC236}">
+                <a16:creationId xmlns:a16="http://schemas.microsoft.com/office/drawing/2014/main" id="{152BE1CC-3479-4FED-B5E3-FB9C04F63114}"/>
+              </a:ext>
+            </a:extLst>
+          </p:cNvPr>
+          <p:cNvSpPr/>
           <p:nvPr/>
-        </p:nvCxnSpPr>
+        </p:nvSpPr>
         <p:spPr>
           <a:xfrm>
-            <a:off x="4845133" y="1690771"/>
-            <a:ext cx="1969438" cy="0"/>
+            <a:off x="7682019" y="2318348"/>
+            <a:ext cx="544947" cy="535709"/>
           </a:xfrm>
-          <a:prstGeom prst="straightConnector1">
-            <a:avLst/>
-          </a:prstGeom>
-          <a:ln w="19050">
-            <a:solidFill>
-              <a:schemeClr val="tx1"/>
-            </a:solidFill>
-            <a:headEnd type="none" w="med" len="med"/>
-            <a:tailEnd type="arrow" w="med" len="med"/>
-          </a:ln>
-        </p:spPr>
-        <p:style>
-          <a:lnRef idx="1">
-            <a:schemeClr val="accent1"/>
-          </a:lnRef>
-          <a:fillRef idx="0">
-            <a:schemeClr val="accent1"/>
-          </a:fillRef>
-          <a:effectRef idx="0">
-            <a:schemeClr val="accent1"/>
-          </a:effectRef>
-          <a:fontRef idx="minor">
-            <a:schemeClr val="tx1"/>
-          </a:fontRef>
-        </p:style>
-      </p:cxnSp>
-      <p:sp>
-        <p:nvSpPr>
-          <p:cNvPr id="23" name="Rectangle: Rounded Corners 22">
-            <a:extLst>
-              <a:ext uri="{FF2B5EF4-FFF2-40B4-BE49-F238E27FC236}">
-                <a16:creationId xmlns:a16="http://schemas.microsoft.com/office/drawing/2014/main" id="{3EF9691A-22F8-4AF7-ACDD-7B6C09A501AC}"/>
-              </a:ext>
-            </a:extLst>
-          </p:cNvPr>
-          <p:cNvSpPr/>
-          <p:nvPr/>
-        </p:nvSpPr>
-        <p:spPr>
-          <a:xfrm>
-            <a:off x="9873222" y="1363559"/>
-            <a:ext cx="1089212" cy="654424"/>
-          </a:xfrm>
-          <a:prstGeom prst="roundRect">
-            <a:avLst/>
+          <a:prstGeom prst="rightArrow">
+            <a:avLst>
+              <a:gd name="adj1" fmla="val 50000"/>
+              <a:gd name="adj2" fmla="val 62069"/>
+            </a:avLst>
           </a:prstGeom>
           <a:solidFill>
-            <a:srgbClr val="FFFFCC"/>
+            <a:schemeClr val="bg1">
+              <a:lumMod val="65000"/>
+            </a:schemeClr>
           </a:solidFill>
+          <a:ln>
+            <a:solidFill>
+              <a:schemeClr val="bg1">
+                <a:lumMod val="65000"/>
+              </a:schemeClr>
+            </a:solidFill>
+          </a:ln>
         </p:spPr>
         <p:style>
           <a:lnRef idx="2">
@@ -4402,87 +5042,45 @@
           <a:lstStyle/>
           <a:p>
             <a:pPr algn="ctr"/>
-            <a:r>
-              <a:rPr lang="en-US" sz="1200" dirty="0">
-                <a:solidFill>
-                  <a:schemeClr val="tx1"/>
-                </a:solidFill>
-              </a:rPr>
-              <a:t>Split target into training and test data</a:t>
-            </a:r>
-          </a:p>
-        </p:txBody>
-      </p:sp>
-      <p:cxnSp>
-        <p:nvCxnSpPr>
-          <p:cNvPr id="24" name="Straight Arrow Connector 23">
-            <a:extLst>
-              <a:ext uri="{FF2B5EF4-FFF2-40B4-BE49-F238E27FC236}">
-                <a16:creationId xmlns:a16="http://schemas.microsoft.com/office/drawing/2014/main" id="{A0B55201-D35E-4DF9-8474-F5FE5986C587}"/>
-              </a:ext>
-            </a:extLst>
-          </p:cNvPr>
-          <p:cNvCxnSpPr>
-            <a:cxnSpLocks/>
-            <a:stCxn id="19" idx="3"/>
-            <a:endCxn id="23" idx="1"/>
-          </p:cNvCxnSpPr>
+            <a:endParaRPr lang="en-US"/>
+          </a:p>
+        </p:txBody>
+      </p:sp>
+      <p:sp>
+        <p:nvSpPr>
+          <p:cNvPr id="63" name="Arrow: Right 62">
+            <a:extLst>
+              <a:ext uri="{FF2B5EF4-FFF2-40B4-BE49-F238E27FC236}">
+                <a16:creationId xmlns:a16="http://schemas.microsoft.com/office/drawing/2014/main" id="{CA17F579-68BC-4E69-9386-238089CC79F7}"/>
+              </a:ext>
+            </a:extLst>
+          </p:cNvPr>
+          <p:cNvSpPr/>
           <p:nvPr/>
-        </p:nvCxnSpPr>
+        </p:nvSpPr>
         <p:spPr>
           <a:xfrm>
-            <a:off x="7903783" y="1690771"/>
-            <a:ext cx="1969439" cy="0"/>
+            <a:off x="9608461" y="2318348"/>
+            <a:ext cx="544947" cy="535709"/>
           </a:xfrm>
-          <a:prstGeom prst="straightConnector1">
-            <a:avLst/>
-          </a:prstGeom>
-          <a:ln w="19050">
-            <a:solidFill>
-              <a:schemeClr val="tx1"/>
-            </a:solidFill>
-            <a:headEnd type="none" w="med" len="med"/>
-            <a:tailEnd type="arrow" w="med" len="med"/>
-          </a:ln>
-        </p:spPr>
-        <p:style>
-          <a:lnRef idx="1">
-            <a:schemeClr val="accent1"/>
-          </a:lnRef>
-          <a:fillRef idx="0">
-            <a:schemeClr val="accent1"/>
-          </a:fillRef>
-          <a:effectRef idx="0">
-            <a:schemeClr val="accent1"/>
-          </a:effectRef>
-          <a:fontRef idx="minor">
-            <a:schemeClr val="tx1"/>
-          </a:fontRef>
-        </p:style>
-      </p:cxnSp>
-      <p:sp>
-        <p:nvSpPr>
-          <p:cNvPr id="26" name="Rectangle: Rounded Corners 25">
-            <a:extLst>
-              <a:ext uri="{FF2B5EF4-FFF2-40B4-BE49-F238E27FC236}">
-                <a16:creationId xmlns:a16="http://schemas.microsoft.com/office/drawing/2014/main" id="{8541CA74-E1EB-4FB4-A581-BAA0C0EBD4D2}"/>
-              </a:ext>
-            </a:extLst>
-          </p:cNvPr>
-          <p:cNvSpPr/>
-          <p:nvPr/>
-        </p:nvSpPr>
-        <p:spPr>
-          <a:xfrm>
-            <a:off x="806095" y="3692396"/>
-            <a:ext cx="1089212" cy="654424"/>
-          </a:xfrm>
-          <a:prstGeom prst="roundRect">
-            <a:avLst/>
+          <a:prstGeom prst="rightArrow">
+            <a:avLst>
+              <a:gd name="adj1" fmla="val 50000"/>
+              <a:gd name="adj2" fmla="val 62069"/>
+            </a:avLst>
           </a:prstGeom>
           <a:solidFill>
-            <a:srgbClr val="FFFFCC"/>
+            <a:schemeClr val="bg1">
+              <a:lumMod val="65000"/>
+            </a:schemeClr>
           </a:solidFill>
+          <a:ln>
+            <a:solidFill>
+              <a:schemeClr val="bg1">
+                <a:lumMod val="65000"/>
+              </a:schemeClr>
+            </a:solidFill>
+          </a:ln>
         </p:spPr>
         <p:style>
           <a:lnRef idx="2">
@@ -4505,573 +5103,7 @@
           <a:lstStyle/>
           <a:p>
             <a:pPr algn="ctr"/>
-            <a:r>
-              <a:rPr lang="en-US" sz="1200" dirty="0">
-                <a:solidFill>
-                  <a:schemeClr val="tx1"/>
-                </a:solidFill>
-              </a:rPr>
-              <a:t>Create Model</a:t>
-            </a:r>
-          </a:p>
-        </p:txBody>
-      </p:sp>
-      <p:cxnSp>
-        <p:nvCxnSpPr>
-          <p:cNvPr id="29" name="Connector: Elbow 28">
-            <a:extLst>
-              <a:ext uri="{FF2B5EF4-FFF2-40B4-BE49-F238E27FC236}">
-                <a16:creationId xmlns:a16="http://schemas.microsoft.com/office/drawing/2014/main" id="{BB7A53A3-D779-4FBD-9517-494B08AF210C}"/>
-              </a:ext>
-            </a:extLst>
-          </p:cNvPr>
-          <p:cNvCxnSpPr>
-            <a:stCxn id="23" idx="2"/>
-            <a:endCxn id="26" idx="0"/>
-          </p:cNvCxnSpPr>
-          <p:nvPr/>
-        </p:nvCxnSpPr>
-        <p:spPr>
-          <a:xfrm rot="5400000">
-            <a:off x="5047059" y="-1678374"/>
-            <a:ext cx="1674413" cy="9067127"/>
-          </a:xfrm>
-          <a:prstGeom prst="bentConnector3">
-            <a:avLst/>
-          </a:prstGeom>
-          <a:ln w="19050">
-            <a:solidFill>
-              <a:schemeClr val="tx1"/>
-            </a:solidFill>
-            <a:headEnd type="none" w="med" len="med"/>
-            <a:tailEnd type="arrow" w="med" len="med"/>
-          </a:ln>
-        </p:spPr>
-        <p:style>
-          <a:lnRef idx="1">
-            <a:schemeClr val="accent1"/>
-          </a:lnRef>
-          <a:fillRef idx="0">
-            <a:schemeClr val="accent1"/>
-          </a:fillRef>
-          <a:effectRef idx="0">
-            <a:schemeClr val="accent1"/>
-          </a:effectRef>
-          <a:fontRef idx="minor">
-            <a:schemeClr val="tx1"/>
-          </a:fontRef>
-        </p:style>
-      </p:cxnSp>
-      <p:sp>
-        <p:nvSpPr>
-          <p:cNvPr id="41" name="TextBox 40">
-            <a:extLst>
-              <a:ext uri="{FF2B5EF4-FFF2-40B4-BE49-F238E27FC236}">
-                <a16:creationId xmlns:a16="http://schemas.microsoft.com/office/drawing/2014/main" id="{35B485F5-B913-44A5-91FF-49FA10C69DF1}"/>
-              </a:ext>
-            </a:extLst>
-          </p:cNvPr>
-          <p:cNvSpPr txBox="1"/>
-          <p:nvPr/>
-        </p:nvSpPr>
-        <p:spPr>
-          <a:xfrm>
-            <a:off x="514351" y="4447594"/>
-            <a:ext cx="2304798" cy="1815882"/>
-          </a:xfrm>
-          <a:prstGeom prst="rect">
-            <a:avLst/>
-          </a:prstGeom>
-          <a:noFill/>
-        </p:spPr>
-        <p:txBody>
-          <a:bodyPr wrap="square" rtlCol="0">
-            <a:spAutoFit/>
-          </a:bodyPr>
-          <a:lstStyle/>
-          <a:p>
-            <a:pPr marL="285750" indent="-285750">
-              <a:buFont typeface="Arial" panose="020B0604020202020204" pitchFamily="34" charset="0"/>
-              <a:buChar char="•"/>
-            </a:pPr>
-            <a:r>
-              <a:rPr lang="en-US" sz="1600" dirty="0"/>
-              <a:t>Model is a linear regression model</a:t>
-            </a:r>
-          </a:p>
-          <a:p>
-            <a:pPr marL="285750" indent="-285750">
-              <a:buFont typeface="Arial" panose="020B0604020202020204" pitchFamily="34" charset="0"/>
-              <a:buChar char="•"/>
-            </a:pPr>
-            <a:r>
-              <a:rPr lang="en-US" sz="1600" dirty="0"/>
-              <a:t> Train the model with training data</a:t>
-            </a:r>
-          </a:p>
-          <a:p>
-            <a:pPr marL="285750" indent="-285750">
-              <a:buFont typeface="Arial" panose="020B0604020202020204" pitchFamily="34" charset="0"/>
-              <a:buChar char="•"/>
-            </a:pPr>
-            <a:endParaRPr lang="en-US" sz="1600" dirty="0"/>
-          </a:p>
-          <a:p>
-            <a:pPr marL="285750" indent="-285750">
-              <a:buFont typeface="Arial" panose="020B0604020202020204" pitchFamily="34" charset="0"/>
-              <a:buChar char="•"/>
-            </a:pPr>
-            <a:endParaRPr lang="en-US" sz="1600" dirty="0"/>
-          </a:p>
-          <a:p>
-            <a:r>
-              <a:rPr lang="en-US" sz="1600" dirty="0"/>
-              <a:t> </a:t>
-            </a:r>
-          </a:p>
-        </p:txBody>
-      </p:sp>
-      <p:sp>
-        <p:nvSpPr>
-          <p:cNvPr id="42" name="Rectangle: Rounded Corners 41">
-            <a:extLst>
-              <a:ext uri="{FF2B5EF4-FFF2-40B4-BE49-F238E27FC236}">
-                <a16:creationId xmlns:a16="http://schemas.microsoft.com/office/drawing/2014/main" id="{AD46BB5E-E462-465E-A934-111F561C7501}"/>
-              </a:ext>
-            </a:extLst>
-          </p:cNvPr>
-          <p:cNvSpPr/>
-          <p:nvPr/>
-        </p:nvSpPr>
-        <p:spPr>
-          <a:xfrm>
-            <a:off x="3853422" y="3699790"/>
-            <a:ext cx="1089212" cy="654424"/>
-          </a:xfrm>
-          <a:prstGeom prst="roundRect">
-            <a:avLst/>
-          </a:prstGeom>
-          <a:solidFill>
-            <a:srgbClr val="FFFFCC"/>
-          </a:solidFill>
-        </p:spPr>
-        <p:style>
-          <a:lnRef idx="2">
-            <a:schemeClr val="accent1">
-              <a:shade val="50000"/>
-            </a:schemeClr>
-          </a:lnRef>
-          <a:fillRef idx="1">
-            <a:schemeClr val="accent1"/>
-          </a:fillRef>
-          <a:effectRef idx="0">
-            <a:schemeClr val="accent1"/>
-          </a:effectRef>
-          <a:fontRef idx="minor">
-            <a:schemeClr val="lt1"/>
-          </a:fontRef>
-        </p:style>
-        <p:txBody>
-          <a:bodyPr rtlCol="0" anchor="ctr"/>
-          <a:lstStyle/>
-          <a:p>
-            <a:pPr algn="ctr"/>
-            <a:r>
-              <a:rPr lang="en-US" sz="1200" dirty="0">
-                <a:solidFill>
-                  <a:schemeClr val="tx1"/>
-                </a:solidFill>
-              </a:rPr>
-              <a:t>Use model to make predictions</a:t>
-            </a:r>
-          </a:p>
-        </p:txBody>
-      </p:sp>
-      <p:cxnSp>
-        <p:nvCxnSpPr>
-          <p:cNvPr id="43" name="Straight Arrow Connector 42">
-            <a:extLst>
-              <a:ext uri="{FF2B5EF4-FFF2-40B4-BE49-F238E27FC236}">
-                <a16:creationId xmlns:a16="http://schemas.microsoft.com/office/drawing/2014/main" id="{92D1C0D3-E953-425D-9000-D59478B4A861}"/>
-              </a:ext>
-            </a:extLst>
-          </p:cNvPr>
-          <p:cNvCxnSpPr>
-            <a:cxnSpLocks/>
-            <a:stCxn id="26" idx="3"/>
-            <a:endCxn id="42" idx="1"/>
-          </p:cNvCxnSpPr>
-          <p:nvPr/>
-        </p:nvCxnSpPr>
-        <p:spPr>
-          <a:xfrm>
-            <a:off x="1895307" y="4019608"/>
-            <a:ext cx="1958115" cy="7394"/>
-          </a:xfrm>
-          <a:prstGeom prst="straightConnector1">
-            <a:avLst/>
-          </a:prstGeom>
-          <a:ln w="19050">
-            <a:solidFill>
-              <a:schemeClr val="tx1"/>
-            </a:solidFill>
-            <a:headEnd type="none" w="med" len="med"/>
-            <a:tailEnd type="arrow" w="med" len="med"/>
-          </a:ln>
-        </p:spPr>
-        <p:style>
-          <a:lnRef idx="1">
-            <a:schemeClr val="accent1"/>
-          </a:lnRef>
-          <a:fillRef idx="0">
-            <a:schemeClr val="accent1"/>
-          </a:fillRef>
-          <a:effectRef idx="0">
-            <a:schemeClr val="accent1"/>
-          </a:effectRef>
-          <a:fontRef idx="minor">
-            <a:schemeClr val="tx1"/>
-          </a:fontRef>
-        </p:style>
-      </p:cxnSp>
-      <p:sp>
-        <p:nvSpPr>
-          <p:cNvPr id="45" name="TextBox 44">
-            <a:extLst>
-              <a:ext uri="{FF2B5EF4-FFF2-40B4-BE49-F238E27FC236}">
-                <a16:creationId xmlns:a16="http://schemas.microsoft.com/office/drawing/2014/main" id="{DF3D7BC0-AF37-478A-8830-A809DA035801}"/>
-              </a:ext>
-            </a:extLst>
-          </p:cNvPr>
-          <p:cNvSpPr txBox="1"/>
-          <p:nvPr/>
-        </p:nvSpPr>
-        <p:spPr>
-          <a:xfrm>
-            <a:off x="3458470" y="4451404"/>
-            <a:ext cx="1959511" cy="584775"/>
-          </a:xfrm>
-          <a:prstGeom prst="rect">
-            <a:avLst/>
-          </a:prstGeom>
-          <a:noFill/>
-        </p:spPr>
-        <p:txBody>
-          <a:bodyPr wrap="square" rtlCol="0">
-            <a:spAutoFit/>
-          </a:bodyPr>
-          <a:lstStyle/>
-          <a:p>
-            <a:pPr marL="285750" indent="-285750">
-              <a:buFont typeface="Arial" panose="020B0604020202020204" pitchFamily="34" charset="0"/>
-              <a:buChar char="•"/>
-            </a:pPr>
-            <a:r>
-              <a:rPr lang="en-US" sz="1600" dirty="0"/>
-              <a:t>Make predictions </a:t>
-            </a:r>
-          </a:p>
-          <a:p>
-            <a:r>
-              <a:rPr lang="en-US" sz="1600" dirty="0"/>
-              <a:t>      with test data</a:t>
-            </a:r>
-          </a:p>
-        </p:txBody>
-      </p:sp>
-      <p:sp>
-        <p:nvSpPr>
-          <p:cNvPr id="48" name="Rectangle: Rounded Corners 47">
-            <a:extLst>
-              <a:ext uri="{FF2B5EF4-FFF2-40B4-BE49-F238E27FC236}">
-                <a16:creationId xmlns:a16="http://schemas.microsoft.com/office/drawing/2014/main" id="{46D282D2-3F76-4FCB-B928-C2E84FDD7F26}"/>
-              </a:ext>
-            </a:extLst>
-          </p:cNvPr>
-          <p:cNvSpPr/>
-          <p:nvPr/>
-        </p:nvSpPr>
-        <p:spPr>
-          <a:xfrm>
-            <a:off x="6900749" y="3699790"/>
-            <a:ext cx="1089212" cy="654424"/>
-          </a:xfrm>
-          <a:prstGeom prst="roundRect">
-            <a:avLst/>
-          </a:prstGeom>
-          <a:solidFill>
-            <a:srgbClr val="FFFFCC"/>
-          </a:solidFill>
-        </p:spPr>
-        <p:style>
-          <a:lnRef idx="2">
-            <a:schemeClr val="accent1">
-              <a:shade val="50000"/>
-            </a:schemeClr>
-          </a:lnRef>
-          <a:fillRef idx="1">
-            <a:schemeClr val="accent1"/>
-          </a:fillRef>
-          <a:effectRef idx="0">
-            <a:schemeClr val="accent1"/>
-          </a:effectRef>
-          <a:fontRef idx="minor">
-            <a:schemeClr val="lt1"/>
-          </a:fontRef>
-        </p:style>
-        <p:txBody>
-          <a:bodyPr rtlCol="0" anchor="ctr"/>
-          <a:lstStyle/>
-          <a:p>
-            <a:pPr algn="ctr"/>
-            <a:r>
-              <a:rPr lang="en-US" sz="1200" dirty="0">
-                <a:solidFill>
-                  <a:schemeClr val="tx1"/>
-                </a:solidFill>
-              </a:rPr>
-              <a:t>Analyze the model’s accuracy</a:t>
-            </a:r>
-          </a:p>
-        </p:txBody>
-      </p:sp>
-      <p:cxnSp>
-        <p:nvCxnSpPr>
-          <p:cNvPr id="49" name="Straight Arrow Connector 48">
-            <a:extLst>
-              <a:ext uri="{FF2B5EF4-FFF2-40B4-BE49-F238E27FC236}">
-                <a16:creationId xmlns:a16="http://schemas.microsoft.com/office/drawing/2014/main" id="{FEBAB5A8-AD7A-4B1A-8D5D-997ED5BC52B9}"/>
-              </a:ext>
-            </a:extLst>
-          </p:cNvPr>
-          <p:cNvCxnSpPr>
-            <a:cxnSpLocks/>
-            <a:stCxn id="42" idx="3"/>
-            <a:endCxn id="48" idx="1"/>
-          </p:cNvCxnSpPr>
-          <p:nvPr/>
-        </p:nvCxnSpPr>
-        <p:spPr>
-          <a:xfrm>
-            <a:off x="4942634" y="4027002"/>
-            <a:ext cx="1958115" cy="0"/>
-          </a:xfrm>
-          <a:prstGeom prst="straightConnector1">
-            <a:avLst/>
-          </a:prstGeom>
-          <a:ln w="19050">
-            <a:solidFill>
-              <a:schemeClr val="tx1"/>
-            </a:solidFill>
-            <a:headEnd type="none" w="med" len="med"/>
-            <a:tailEnd type="arrow" w="med" len="med"/>
-          </a:ln>
-        </p:spPr>
-        <p:style>
-          <a:lnRef idx="1">
-            <a:schemeClr val="accent1"/>
-          </a:lnRef>
-          <a:fillRef idx="0">
-            <a:schemeClr val="accent1"/>
-          </a:fillRef>
-          <a:effectRef idx="0">
-            <a:schemeClr val="accent1"/>
-          </a:effectRef>
-          <a:fontRef idx="minor">
-            <a:schemeClr val="tx1"/>
-          </a:fontRef>
-        </p:style>
-      </p:cxnSp>
-      <p:sp>
-        <p:nvSpPr>
-          <p:cNvPr id="54" name="TextBox 53">
-            <a:extLst>
-              <a:ext uri="{FF2B5EF4-FFF2-40B4-BE49-F238E27FC236}">
-                <a16:creationId xmlns:a16="http://schemas.microsoft.com/office/drawing/2014/main" id="{1FEEAB13-2A72-499F-BAF5-6CBAD570A02A}"/>
-              </a:ext>
-            </a:extLst>
-          </p:cNvPr>
-          <p:cNvSpPr txBox="1"/>
-          <p:nvPr/>
-        </p:nvSpPr>
-        <p:spPr>
-          <a:xfrm>
-            <a:off x="6379421" y="4446035"/>
-            <a:ext cx="2270878" cy="338554"/>
-          </a:xfrm>
-          <a:prstGeom prst="rect">
-            <a:avLst/>
-          </a:prstGeom>
-          <a:noFill/>
-        </p:spPr>
-        <p:txBody>
-          <a:bodyPr wrap="square" rtlCol="0">
-            <a:spAutoFit/>
-          </a:bodyPr>
-          <a:lstStyle/>
-          <a:p>
-            <a:pPr marL="285750" indent="-285750">
-              <a:buFont typeface="Arial" panose="020B0604020202020204" pitchFamily="34" charset="0"/>
-              <a:buChar char="•"/>
-            </a:pPr>
-            <a:r>
-              <a:rPr lang="en-US" sz="1600" dirty="0"/>
-              <a:t>Calculate MSE and R2</a:t>
-            </a:r>
-          </a:p>
-        </p:txBody>
-      </p:sp>
-      <p:sp>
-        <p:nvSpPr>
-          <p:cNvPr id="55" name="Rectangle: Rounded Corners 54">
-            <a:extLst>
-              <a:ext uri="{FF2B5EF4-FFF2-40B4-BE49-F238E27FC236}">
-                <a16:creationId xmlns:a16="http://schemas.microsoft.com/office/drawing/2014/main" id="{43CA38BC-3C1C-4591-B6EA-6AEE96ADE3E7}"/>
-              </a:ext>
-            </a:extLst>
-          </p:cNvPr>
-          <p:cNvSpPr/>
-          <p:nvPr/>
-        </p:nvSpPr>
-        <p:spPr>
-          <a:xfrm>
-            <a:off x="9948076" y="3699790"/>
-            <a:ext cx="1089212" cy="654424"/>
-          </a:xfrm>
-          <a:prstGeom prst="roundRect">
-            <a:avLst/>
-          </a:prstGeom>
-          <a:solidFill>
-            <a:srgbClr val="FFFFCC"/>
-          </a:solidFill>
-        </p:spPr>
-        <p:style>
-          <a:lnRef idx="2">
-            <a:schemeClr val="accent1">
-              <a:shade val="50000"/>
-            </a:schemeClr>
-          </a:lnRef>
-          <a:fillRef idx="1">
-            <a:schemeClr val="accent1"/>
-          </a:fillRef>
-          <a:effectRef idx="0">
-            <a:schemeClr val="accent1"/>
-          </a:effectRef>
-          <a:fontRef idx="minor">
-            <a:schemeClr val="lt1"/>
-          </a:fontRef>
-        </p:style>
-        <p:txBody>
-          <a:bodyPr rtlCol="0" anchor="ctr"/>
-          <a:lstStyle/>
-          <a:p>
-            <a:pPr algn="ctr"/>
-            <a:r>
-              <a:rPr lang="en-US" sz="1200" dirty="0">
-                <a:solidFill>
-                  <a:schemeClr val="tx1"/>
-                </a:solidFill>
-              </a:rPr>
-              <a:t>Use  model to predict users’ times</a:t>
-            </a:r>
-          </a:p>
-        </p:txBody>
-      </p:sp>
-      <p:cxnSp>
-        <p:nvCxnSpPr>
-          <p:cNvPr id="56" name="Straight Arrow Connector 55">
-            <a:extLst>
-              <a:ext uri="{FF2B5EF4-FFF2-40B4-BE49-F238E27FC236}">
-                <a16:creationId xmlns:a16="http://schemas.microsoft.com/office/drawing/2014/main" id="{7F2D985F-690B-48B5-A166-03926B60E1E6}"/>
-              </a:ext>
-            </a:extLst>
-          </p:cNvPr>
-          <p:cNvCxnSpPr>
-            <a:cxnSpLocks/>
-            <a:stCxn id="48" idx="3"/>
-            <a:endCxn id="55" idx="1"/>
-          </p:cNvCxnSpPr>
-          <p:nvPr/>
-        </p:nvCxnSpPr>
-        <p:spPr>
-          <a:xfrm>
-            <a:off x="7989961" y="4027002"/>
-            <a:ext cx="1958115" cy="0"/>
-          </a:xfrm>
-          <a:prstGeom prst="straightConnector1">
-            <a:avLst/>
-          </a:prstGeom>
-          <a:ln w="19050">
-            <a:solidFill>
-              <a:schemeClr val="tx1"/>
-            </a:solidFill>
-            <a:headEnd type="none" w="med" len="med"/>
-            <a:tailEnd type="arrow" w="med" len="med"/>
-          </a:ln>
-        </p:spPr>
-        <p:style>
-          <a:lnRef idx="1">
-            <a:schemeClr val="accent1"/>
-          </a:lnRef>
-          <a:fillRef idx="0">
-            <a:schemeClr val="accent1"/>
-          </a:fillRef>
-          <a:effectRef idx="0">
-            <a:schemeClr val="accent1"/>
-          </a:effectRef>
-          <a:fontRef idx="minor">
-            <a:schemeClr val="tx1"/>
-          </a:fontRef>
-        </p:style>
-      </p:cxnSp>
-      <p:sp>
-        <p:nvSpPr>
-          <p:cNvPr id="70" name="TextBox 69">
-            <a:extLst>
-              <a:ext uri="{FF2B5EF4-FFF2-40B4-BE49-F238E27FC236}">
-                <a16:creationId xmlns:a16="http://schemas.microsoft.com/office/drawing/2014/main" id="{C15AD00E-92A6-4703-8B14-64B9B7E021C4}"/>
-              </a:ext>
-            </a:extLst>
-          </p:cNvPr>
-          <p:cNvSpPr txBox="1"/>
-          <p:nvPr/>
-        </p:nvSpPr>
-        <p:spPr>
-          <a:xfrm>
-            <a:off x="9387782" y="4446035"/>
-            <a:ext cx="1978106" cy="830997"/>
-          </a:xfrm>
-          <a:prstGeom prst="rect">
-            <a:avLst/>
-          </a:prstGeom>
-          <a:noFill/>
-        </p:spPr>
-        <p:txBody>
-          <a:bodyPr wrap="square" rtlCol="0">
-            <a:spAutoFit/>
-          </a:bodyPr>
-          <a:lstStyle/>
-          <a:p>
-            <a:pPr marL="285750" indent="-285750">
-              <a:buFont typeface="Arial" panose="020B0604020202020204" pitchFamily="34" charset="0"/>
-              <a:buChar char="•"/>
-            </a:pPr>
-            <a:r>
-              <a:rPr lang="en-US" sz="1600" dirty="0"/>
-              <a:t>Model is saved as</a:t>
-            </a:r>
-          </a:p>
-          <a:p>
-            <a:r>
-              <a:rPr lang="en-US" sz="1600" dirty="0"/>
-              <a:t>      a static file once it</a:t>
-            </a:r>
-          </a:p>
-          <a:p>
-            <a:r>
-              <a:rPr lang="en-US" sz="1600" dirty="0"/>
-              <a:t>      Is trained</a:t>
-            </a:r>
+            <a:endParaRPr lang="en-US"/>
           </a:p>
         </p:txBody>
       </p:sp>

</xml_diff>

<commit_message>
updated html and powerpoint
</commit_message>
<xml_diff>
--- a/slides/Project3_slides.pptx
+++ b/slides/Project3_slides.pptx
@@ -5152,234 +5152,6 @@
           <a:chExt cx="0" cy="0"/>
         </a:xfrm>
       </p:grpSpPr>
-      <p:sp>
-        <p:nvSpPr>
-          <p:cNvPr id="7" name="Rectangle 1">
-            <a:extLst>
-              <a:ext uri="{FF2B5EF4-FFF2-40B4-BE49-F238E27FC236}">
-                <a16:creationId xmlns:a16="http://schemas.microsoft.com/office/drawing/2014/main" id="{3DE51DEF-F51C-4FFB-BC90-322867C33FEC}"/>
-              </a:ext>
-            </a:extLst>
-          </p:cNvPr>
-          <p:cNvSpPr>
-            <a:spLocks noChangeArrowheads="1"/>
-          </p:cNvSpPr>
-          <p:nvPr/>
-        </p:nvSpPr>
-        <p:spPr bwMode="auto">
-          <a:xfrm>
-            <a:off x="0" y="128841"/>
-            <a:ext cx="38975514" cy="138499"/>
-          </a:xfrm>
-          <a:prstGeom prst="rect">
-            <a:avLst/>
-          </a:prstGeom>
-          <a:solidFill>
-            <a:srgbClr val="FFFFFF"/>
-          </a:solidFill>
-          <a:ln>
-            <a:noFill/>
-          </a:ln>
-          <a:effectLst/>
-          <a:extLst>
-            <a:ext uri="{91240B29-F687-4F45-9708-019B960494DF}">
-              <a14:hiddenLine xmlns:a14="http://schemas.microsoft.com/office/drawing/2010/main" w="9525">
-                <a:solidFill>
-                  <a:schemeClr val="tx1"/>
-                </a:solidFill>
-                <a:miter lim="800000"/>
-                <a:headEnd/>
-                <a:tailEnd/>
-              </a14:hiddenLine>
-            </a:ext>
-            <a:ext uri="{AF507438-7753-43E0-B8FC-AC1667EBCBE1}">
-              <a14:hiddenEffects xmlns:a14="http://schemas.microsoft.com/office/drawing/2010/main">
-                <a:effectLst>
-                  <a:outerShdw dist="35921" dir="2700000" algn="ctr" rotWithShape="0">
-                    <a:schemeClr val="bg2"/>
-                  </a:outerShdw>
-                </a:effectLst>
-              </a14:hiddenEffects>
-            </a:ext>
-          </a:extLst>
-        </p:spPr>
-        <p:txBody>
-          <a:bodyPr vert="horz" wrap="square" lIns="0" tIns="0" rIns="0" bIns="0" numCol="1" anchor="ctr" anchorCtr="0" compatLnSpc="1">
-            <a:prstTxWarp prst="textNoShape">
-              <a:avLst/>
-            </a:prstTxWarp>
-            <a:spAutoFit/>
-          </a:bodyPr>
-          <a:lstStyle/>
-          <a:p>
-            <a:pPr marL="0" marR="0" lvl="0" indent="0" algn="l" defTabSz="914400" rtl="0" eaLnBrk="0" fontAlgn="base" latinLnBrk="0" hangingPunct="0">
-              <a:lnSpc>
-                <a:spcPct val="100000"/>
-              </a:lnSpc>
-              <a:spcBef>
-                <a:spcPct val="0"/>
-              </a:spcBef>
-              <a:spcAft>
-                <a:spcPct val="0"/>
-              </a:spcAft>
-              <a:buClrTx/>
-              <a:buSzTx/>
-              <a:buFontTx/>
-              <a:buNone/>
-              <a:tabLst/>
-            </a:pPr>
-            <a:r>
-              <a:rPr kumimoji="0" lang="en-US" altLang="en-US" sz="900" b="0" i="0" u="none" strike="noStrike" cap="none" normalizeH="0" baseline="0">
-                <a:ln>
-                  <a:noFill/>
-                </a:ln>
-                <a:solidFill>
-                  <a:schemeClr val="tx1"/>
-                </a:solidFill>
-                <a:effectLst/>
-                <a:latin typeface="var(--jp-code-font-family)"/>
-              </a:rPr>
-              <a:t>MSE: 7302.025220648334, R2: 0.805284760701195</a:t>
-            </a:r>
-            <a:r>
-              <a:rPr kumimoji="0" lang="en-US" altLang="en-US" sz="400" b="0" i="0" u="none" strike="noStrike" cap="none" normalizeH="0" baseline="0">
-                <a:ln>
-                  <a:noFill/>
-                </a:ln>
-                <a:solidFill>
-                  <a:schemeClr val="tx1"/>
-                </a:solidFill>
-                <a:effectLst/>
-              </a:rPr>
-              <a:t> </a:t>
-            </a:r>
-            <a:endParaRPr kumimoji="0" lang="en-US" altLang="en-US" sz="1800" b="0" i="0" u="none" strike="noStrike" cap="none" normalizeH="0" baseline="0">
-              <a:ln>
-                <a:noFill/>
-              </a:ln>
-              <a:solidFill>
-                <a:schemeClr val="tx1"/>
-              </a:solidFill>
-              <a:effectLst/>
-              <a:latin typeface="Arial" panose="020B0604020202020204" pitchFamily="34" charset="0"/>
-            </a:endParaRPr>
-          </a:p>
-        </p:txBody>
-      </p:sp>
-      <p:sp>
-        <p:nvSpPr>
-          <p:cNvPr id="8" name="Rectangle 2">
-            <a:extLst>
-              <a:ext uri="{FF2B5EF4-FFF2-40B4-BE49-F238E27FC236}">
-                <a16:creationId xmlns:a16="http://schemas.microsoft.com/office/drawing/2014/main" id="{85C85B41-E6E6-4CC4-AE79-18313457BD4B}"/>
-              </a:ext>
-            </a:extLst>
-          </p:cNvPr>
-          <p:cNvSpPr>
-            <a:spLocks noChangeArrowheads="1"/>
-          </p:cNvSpPr>
-          <p:nvPr/>
-        </p:nvSpPr>
-        <p:spPr bwMode="auto">
-          <a:xfrm>
-            <a:off x="-1" y="221943"/>
-            <a:ext cx="32643097" cy="138499"/>
-          </a:xfrm>
-          <a:prstGeom prst="rect">
-            <a:avLst/>
-          </a:prstGeom>
-          <a:solidFill>
-            <a:srgbClr val="FFFFFF"/>
-          </a:solidFill>
-          <a:ln>
-            <a:noFill/>
-          </a:ln>
-          <a:effectLst/>
-          <a:extLst>
-            <a:ext uri="{91240B29-F687-4F45-9708-019B960494DF}">
-              <a14:hiddenLine xmlns:a14="http://schemas.microsoft.com/office/drawing/2010/main" w="9525">
-                <a:solidFill>
-                  <a:schemeClr val="tx1"/>
-                </a:solidFill>
-                <a:miter lim="800000"/>
-                <a:headEnd/>
-                <a:tailEnd/>
-              </a14:hiddenLine>
-            </a:ext>
-            <a:ext uri="{AF507438-7753-43E0-B8FC-AC1667EBCBE1}">
-              <a14:hiddenEffects xmlns:a14="http://schemas.microsoft.com/office/drawing/2010/main">
-                <a:effectLst>
-                  <a:outerShdw dist="35921" dir="2700000" algn="ctr" rotWithShape="0">
-                    <a:schemeClr val="bg2"/>
-                  </a:outerShdw>
-                </a:effectLst>
-              </a14:hiddenEffects>
-            </a:ext>
-          </a:extLst>
-        </p:spPr>
-        <p:txBody>
-          <a:bodyPr vert="horz" wrap="square" lIns="0" tIns="0" rIns="0" bIns="0" numCol="1" anchor="ctr" anchorCtr="0" compatLnSpc="1">
-            <a:prstTxWarp prst="textNoShape">
-              <a:avLst/>
-            </a:prstTxWarp>
-            <a:spAutoFit/>
-          </a:bodyPr>
-          <a:lstStyle/>
-          <a:p>
-            <a:pPr marL="0" marR="0" lvl="0" indent="0" algn="l" defTabSz="914400" rtl="0" eaLnBrk="0" fontAlgn="base" latinLnBrk="0" hangingPunct="0">
-              <a:lnSpc>
-                <a:spcPct val="100000"/>
-              </a:lnSpc>
-              <a:spcBef>
-                <a:spcPct val="0"/>
-              </a:spcBef>
-              <a:spcAft>
-                <a:spcPct val="0"/>
-              </a:spcAft>
-              <a:buClrTx/>
-              <a:buSzTx/>
-              <a:buFontTx/>
-              <a:buNone/>
-              <a:tabLst/>
-            </a:pPr>
-            <a:r>
-              <a:rPr kumimoji="0" lang="en-US" altLang="en-US" sz="900" b="0" i="0" u="none" strike="noStrike" cap="none" normalizeH="0" baseline="0">
-                <a:ln>
-                  <a:noFill/>
-                </a:ln>
-                <a:solidFill>
-                  <a:schemeClr val="tx1"/>
-                </a:solidFill>
-                <a:effectLst/>
-                <a:latin typeface="var(--jp-code-font-family)"/>
-              </a:rPr>
-              <a:t>MSE: 7302.025220648334, R2: 0.805284760701195</a:t>
-            </a:r>
-            <a:r>
-              <a:rPr kumimoji="0" lang="en-US" altLang="en-US" sz="400" b="0" i="0" u="none" strike="noStrike" cap="none" normalizeH="0" baseline="0">
-                <a:ln>
-                  <a:noFill/>
-                </a:ln>
-                <a:solidFill>
-                  <a:schemeClr val="tx1"/>
-                </a:solidFill>
-                <a:effectLst/>
-              </a:rPr>
-              <a:t> </a:t>
-            </a:r>
-            <a:endParaRPr kumimoji="0" lang="en-US" altLang="en-US" sz="1800" b="0" i="0" u="none" strike="noStrike" cap="none" normalizeH="0" baseline="0">
-              <a:ln>
-                <a:noFill/>
-              </a:ln>
-              <a:solidFill>
-                <a:schemeClr val="tx1"/>
-              </a:solidFill>
-              <a:effectLst/>
-              <a:latin typeface="Arial" panose="020B0604020202020204" pitchFamily="34" charset="0"/>
-            </a:endParaRPr>
-          </a:p>
-        </p:txBody>
-      </p:sp>
       <p:grpSp>
         <p:nvGrpSpPr>
           <p:cNvPr id="13" name="Group 12">
@@ -5394,7 +5166,7 @@
         </p:nvGrpSpPr>
         <p:grpSpPr>
           <a:xfrm>
-            <a:off x="6367222" y="2843489"/>
+            <a:off x="6441114" y="3055926"/>
             <a:ext cx="4935141" cy="3383280"/>
             <a:chOff x="5437582" y="2722087"/>
             <a:chExt cx="4935141" cy="3775859"/>
@@ -5492,7 +5264,7 @@
         </p:nvGrpSpPr>
         <p:grpSpPr>
           <a:xfrm>
-            <a:off x="423003" y="930869"/>
+            <a:off x="963530" y="3055926"/>
             <a:ext cx="4935141" cy="3383280"/>
             <a:chOff x="876393" y="789899"/>
             <a:chExt cx="4935141" cy="3765492"/>
@@ -5576,6 +5348,150 @@
           </p:txBody>
         </p:sp>
       </p:grpSp>
+      <p:sp>
+        <p:nvSpPr>
+          <p:cNvPr id="10" name="Rectangle 9">
+            <a:extLst>
+              <a:ext uri="{FF2B5EF4-FFF2-40B4-BE49-F238E27FC236}">
+                <a16:creationId xmlns:a16="http://schemas.microsoft.com/office/drawing/2014/main" id="{A65D5CFB-4815-48FB-A576-A8D24019337A}"/>
+              </a:ext>
+            </a:extLst>
+          </p:cNvPr>
+          <p:cNvSpPr/>
+          <p:nvPr/>
+        </p:nvSpPr>
+        <p:spPr>
+          <a:xfrm>
+            <a:off x="0" y="-2966"/>
+            <a:ext cx="12192000" cy="840856"/>
+          </a:xfrm>
+          <a:prstGeom prst="rect">
+            <a:avLst/>
+          </a:prstGeom>
+          <a:solidFill>
+            <a:schemeClr val="accent5">
+              <a:lumMod val="50000"/>
+            </a:schemeClr>
+          </a:solidFill>
+          <a:ln>
+            <a:noFill/>
+          </a:ln>
+        </p:spPr>
+        <p:style>
+          <a:lnRef idx="2">
+            <a:schemeClr val="accent1">
+              <a:shade val="50000"/>
+            </a:schemeClr>
+          </a:lnRef>
+          <a:fillRef idx="1">
+            <a:schemeClr val="accent1"/>
+          </a:fillRef>
+          <a:effectRef idx="0">
+            <a:schemeClr val="accent1"/>
+          </a:effectRef>
+          <a:fontRef idx="minor">
+            <a:schemeClr val="lt1"/>
+          </a:fontRef>
+        </p:style>
+        <p:txBody>
+          <a:bodyPr rtlCol="0" anchor="ctr"/>
+          <a:lstStyle/>
+          <a:p>
+            <a:pPr algn="ctr"/>
+            <a:endParaRPr lang="en-US"/>
+          </a:p>
+        </p:txBody>
+      </p:sp>
+      <p:sp>
+        <p:nvSpPr>
+          <p:cNvPr id="12" name="TextBox 11">
+            <a:extLst>
+              <a:ext uri="{FF2B5EF4-FFF2-40B4-BE49-F238E27FC236}">
+                <a16:creationId xmlns:a16="http://schemas.microsoft.com/office/drawing/2014/main" id="{C1BB3180-487C-40AF-B546-275BDA2F3FB1}"/>
+              </a:ext>
+            </a:extLst>
+          </p:cNvPr>
+          <p:cNvSpPr txBox="1"/>
+          <p:nvPr/>
+        </p:nvSpPr>
+        <p:spPr>
+          <a:xfrm>
+            <a:off x="806095" y="26787"/>
+            <a:ext cx="11385905" cy="707886"/>
+          </a:xfrm>
+          <a:prstGeom prst="rect">
+            <a:avLst/>
+          </a:prstGeom>
+          <a:noFill/>
+        </p:spPr>
+        <p:txBody>
+          <a:bodyPr wrap="square" rtlCol="0">
+            <a:spAutoFit/>
+          </a:bodyPr>
+          <a:lstStyle/>
+          <a:p>
+            <a:r>
+              <a:rPr lang="en-US" sz="4000" dirty="0">
+                <a:solidFill>
+                  <a:schemeClr val="bg1"/>
+                </a:solidFill>
+              </a:rPr>
+              <a:t>Residual Plots</a:t>
+            </a:r>
+          </a:p>
+        </p:txBody>
+      </p:sp>
+      <p:sp>
+        <p:nvSpPr>
+          <p:cNvPr id="2" name="TextBox 1">
+            <a:extLst>
+              <a:ext uri="{FF2B5EF4-FFF2-40B4-BE49-F238E27FC236}">
+                <a16:creationId xmlns:a16="http://schemas.microsoft.com/office/drawing/2014/main" id="{C9848EF5-F5CB-4CE3-9D63-5C3683A47C8D}"/>
+              </a:ext>
+            </a:extLst>
+          </p:cNvPr>
+          <p:cNvSpPr txBox="1"/>
+          <p:nvPr/>
+        </p:nvSpPr>
+        <p:spPr>
+          <a:xfrm>
+            <a:off x="669636" y="1132803"/>
+            <a:ext cx="10852728" cy="1708160"/>
+          </a:xfrm>
+          <a:prstGeom prst="rect">
+            <a:avLst/>
+          </a:prstGeom>
+          <a:noFill/>
+        </p:spPr>
+        <p:txBody>
+          <a:bodyPr wrap="square" rtlCol="0">
+            <a:spAutoFit/>
+          </a:bodyPr>
+          <a:lstStyle/>
+          <a:p>
+            <a:pPr>
+              <a:spcAft>
+                <a:spcPts val="600"/>
+              </a:spcAft>
+            </a:pPr>
+            <a:r>
+              <a:rPr lang="en-US" sz="2000" dirty="0"/>
+              <a:t>After testing the model, we reviewed the residual plots to determine model accuracy. The residual is the difference between the actual value and the predicted value for each point of test data.</a:t>
+            </a:r>
+          </a:p>
+          <a:p>
+            <a:pPr>
+              <a:spcAft>
+                <a:spcPts val="600"/>
+              </a:spcAft>
+            </a:pPr>
+            <a:r>
+              <a:rPr lang="en-US" sz="2000" dirty="0"/>
+              <a:t>We wanted to see if the bib number impacted the accuracy of the model predictions. The plots below show residuals with and without bib number. Since the R2 is better for model on the left, bib number does impact the accuracy of the model.</a:t>
+            </a:r>
+          </a:p>
+        </p:txBody>
+      </p:sp>
     </p:spTree>
     <p:extLst>
       <p:ext uri="{BB962C8B-B14F-4D97-AF65-F5344CB8AC3E}">
@@ -5766,7 +5682,7 @@
         </p:blipFill>
         <p:spPr>
           <a:xfrm>
-            <a:off x="567065" y="1054953"/>
+            <a:off x="806095" y="2990433"/>
             <a:ext cx="5074920" cy="3383280"/>
           </a:xfrm>
           <a:prstGeom prst="rect">
@@ -5810,6 +5726,150 @@
           </a:prstGeom>
         </p:spPr>
       </p:pic>
+      <p:sp>
+        <p:nvSpPr>
+          <p:cNvPr id="4" name="Rectangle 3">
+            <a:extLst>
+              <a:ext uri="{FF2B5EF4-FFF2-40B4-BE49-F238E27FC236}">
+                <a16:creationId xmlns:a16="http://schemas.microsoft.com/office/drawing/2014/main" id="{08A5F43F-65D0-4838-8C91-083E799B8CA0}"/>
+              </a:ext>
+            </a:extLst>
+          </p:cNvPr>
+          <p:cNvSpPr/>
+          <p:nvPr/>
+        </p:nvSpPr>
+        <p:spPr>
+          <a:xfrm>
+            <a:off x="0" y="-2966"/>
+            <a:ext cx="12192000" cy="840856"/>
+          </a:xfrm>
+          <a:prstGeom prst="rect">
+            <a:avLst/>
+          </a:prstGeom>
+          <a:solidFill>
+            <a:schemeClr val="accent5">
+              <a:lumMod val="50000"/>
+            </a:schemeClr>
+          </a:solidFill>
+          <a:ln>
+            <a:noFill/>
+          </a:ln>
+        </p:spPr>
+        <p:style>
+          <a:lnRef idx="2">
+            <a:schemeClr val="accent1">
+              <a:shade val="50000"/>
+            </a:schemeClr>
+          </a:lnRef>
+          <a:fillRef idx="1">
+            <a:schemeClr val="accent1"/>
+          </a:fillRef>
+          <a:effectRef idx="0">
+            <a:schemeClr val="accent1"/>
+          </a:effectRef>
+          <a:fontRef idx="minor">
+            <a:schemeClr val="lt1"/>
+          </a:fontRef>
+        </p:style>
+        <p:txBody>
+          <a:bodyPr rtlCol="0" anchor="ctr"/>
+          <a:lstStyle/>
+          <a:p>
+            <a:pPr algn="ctr"/>
+            <a:endParaRPr lang="en-US"/>
+          </a:p>
+        </p:txBody>
+      </p:sp>
+      <p:sp>
+        <p:nvSpPr>
+          <p:cNvPr id="6" name="TextBox 5">
+            <a:extLst>
+              <a:ext uri="{FF2B5EF4-FFF2-40B4-BE49-F238E27FC236}">
+                <a16:creationId xmlns:a16="http://schemas.microsoft.com/office/drawing/2014/main" id="{9E4E5B9D-D4F8-4A4F-9DF1-D5A2B632EED8}"/>
+              </a:ext>
+            </a:extLst>
+          </p:cNvPr>
+          <p:cNvSpPr txBox="1"/>
+          <p:nvPr/>
+        </p:nvSpPr>
+        <p:spPr>
+          <a:xfrm>
+            <a:off x="806095" y="26787"/>
+            <a:ext cx="11385905" cy="707886"/>
+          </a:xfrm>
+          <a:prstGeom prst="rect">
+            <a:avLst/>
+          </a:prstGeom>
+          <a:noFill/>
+        </p:spPr>
+        <p:txBody>
+          <a:bodyPr wrap="square" rtlCol="0">
+            <a:spAutoFit/>
+          </a:bodyPr>
+          <a:lstStyle/>
+          <a:p>
+            <a:r>
+              <a:rPr lang="en-US" sz="4000" dirty="0">
+                <a:solidFill>
+                  <a:schemeClr val="bg1"/>
+                </a:solidFill>
+              </a:rPr>
+              <a:t>R2 &amp; MSE for Each Model</a:t>
+            </a:r>
+          </a:p>
+        </p:txBody>
+      </p:sp>
+      <p:sp>
+        <p:nvSpPr>
+          <p:cNvPr id="7" name="TextBox 6">
+            <a:extLst>
+              <a:ext uri="{FF2B5EF4-FFF2-40B4-BE49-F238E27FC236}">
+                <a16:creationId xmlns:a16="http://schemas.microsoft.com/office/drawing/2014/main" id="{4276CAD0-9100-486F-9FA2-DAC32DC0B434}"/>
+              </a:ext>
+            </a:extLst>
+          </p:cNvPr>
+          <p:cNvSpPr txBox="1"/>
+          <p:nvPr/>
+        </p:nvSpPr>
+        <p:spPr>
+          <a:xfrm>
+            <a:off x="669636" y="1132803"/>
+            <a:ext cx="10852728" cy="1400383"/>
+          </a:xfrm>
+          <a:prstGeom prst="rect">
+            <a:avLst/>
+          </a:prstGeom>
+          <a:noFill/>
+        </p:spPr>
+        <p:txBody>
+          <a:bodyPr wrap="square" rtlCol="0">
+            <a:spAutoFit/>
+          </a:bodyPr>
+          <a:lstStyle/>
+          <a:p>
+            <a:pPr>
+              <a:spcAft>
+                <a:spcPts val="600"/>
+              </a:spcAft>
+            </a:pPr>
+            <a:r>
+              <a:rPr lang="en-US" sz="2000" dirty="0"/>
+              <a:t>We run the model for each km marker as well as the half and final time. Below are plots showing the R2 and MSE for each model. </a:t>
+            </a:r>
+          </a:p>
+          <a:p>
+            <a:pPr>
+              <a:spcAft>
+                <a:spcPts val="600"/>
+              </a:spcAft>
+            </a:pPr>
+            <a:r>
+              <a:rPr lang="en-US" sz="2000" dirty="0"/>
+              <a:t>Since each consecutive model uses the km split times of the prior, the R2 improves considerably after the first 5K prediction.</a:t>
+            </a:r>
+          </a:p>
+        </p:txBody>
+      </p:sp>
     </p:spTree>
     <p:extLst>
       <p:ext uri="{BB962C8B-B14F-4D97-AF65-F5344CB8AC3E}">

</xml_diff>

<commit_message>
pushing images of slides
</commit_message>
<xml_diff>
--- a/slides/Project3_slides.pptx
+++ b/slides/Project3_slides.pptx
@@ -5854,7 +5854,7 @@
             </a:pPr>
             <a:r>
               <a:rPr lang="en-US" sz="2000" dirty="0"/>
-              <a:t>We run the model for each km marker as well as the half and final time. Below are plots showing the R2 and MSE for each model. </a:t>
+              <a:t>We ran the model for each km marker as well as the half and final time. The plots below show the R2 and MSE for each model. </a:t>
             </a:r>
           </a:p>
           <a:p>
@@ -5865,7 +5865,7 @@
             </a:pPr>
             <a:r>
               <a:rPr lang="en-US" sz="2000" dirty="0"/>
-              <a:t>Since each consecutive model uses the km split times of the prior, the R2 improves considerably after the first 5K prediction.</a:t>
+              <a:t>Since each consecutive model uses the km split times of the prior, the R2 improves considerably after the first 5K prediction. </a:t>
             </a:r>
           </a:p>
         </p:txBody>

</xml_diff>

<commit_message>
updated powerpoint and slide images
</commit_message>
<xml_diff>
--- a/slides/Project3_slides.pptx
+++ b/slides/Project3_slides.pptx
@@ -4564,7 +4564,7 @@
             </a:pPr>
             <a:r>
               <a:rPr lang="en-US" sz="1600" dirty="0"/>
-              <a:t>Finished model saved as static file</a:t>
+              <a:t>Trained model saved as static file</a:t>
             </a:r>
           </a:p>
         </p:txBody>
@@ -5682,7 +5682,7 @@
         </p:blipFill>
         <p:spPr>
           <a:xfrm>
-            <a:off x="806095" y="2990433"/>
+            <a:off x="806095" y="2574799"/>
             <a:ext cx="5074920" cy="3383280"/>
           </a:xfrm>
           <a:prstGeom prst="rect">
@@ -5718,7 +5718,7 @@
         </p:blipFill>
         <p:spPr>
           <a:xfrm>
-            <a:off x="6392555" y="2990433"/>
+            <a:off x="6392555" y="2574799"/>
             <a:ext cx="5074920" cy="3383280"/>
           </a:xfrm>
           <a:prstGeom prst="rect">
@@ -5833,8 +5833,8 @@
         </p:nvSpPr>
         <p:spPr>
           <a:xfrm>
-            <a:off x="669636" y="1132803"/>
-            <a:ext cx="10852728" cy="1400383"/>
+            <a:off x="669636" y="1169747"/>
+            <a:ext cx="10852728" cy="1015663"/>
           </a:xfrm>
           <a:prstGeom prst="rect">
             <a:avLst/>
@@ -5854,18 +5854,7 @@
             </a:pPr>
             <a:r>
               <a:rPr lang="en-US" sz="2000" dirty="0"/>
-              <a:t>We ran the model for each km marker as well as the half and final time. The plots below show the R2 and MSE for each model. </a:t>
-            </a:r>
-          </a:p>
-          <a:p>
-            <a:pPr>
-              <a:spcAft>
-                <a:spcPts val="600"/>
-              </a:spcAft>
-            </a:pPr>
-            <a:r>
-              <a:rPr lang="en-US" sz="2000" dirty="0"/>
-              <a:t>Since each consecutive model uses the km split times of the prior, the R2 improves considerably after the first 5K prediction. </a:t>
+              <a:t>We ran the model for each km split as well as the half and final time. The plots below show the R2 and MSE for each model. Since each consecutive model uses the km split times of the prior, the R2 improves considerably after the first 5K prediction. </a:t>
             </a:r>
           </a:p>
         </p:txBody>

</xml_diff>